<commit_message>
Update exam management, styles, and dashboard features
</commit_message>
<xml_diff>
--- a/Main Project Final Report/Presentation/Seminar PPT Template B24.pptx
+++ b/Main Project Final Report/Presentation/Seminar PPT Template B24.pptx
@@ -17,9 +17,9 @@
     <p:sldId id="411" r:id="rId8"/>
     <p:sldId id="412" r:id="rId9"/>
     <p:sldId id="408" r:id="rId10"/>
-    <p:sldId id="413" r:id="rId11"/>
-    <p:sldId id="420" r:id="rId12"/>
-    <p:sldId id="421" r:id="rId13"/>
+    <p:sldId id="423" r:id="rId11"/>
+    <p:sldId id="413" r:id="rId12"/>
+    <p:sldId id="420" r:id="rId13"/>
     <p:sldId id="422" r:id="rId14"/>
     <p:sldId id="418" r:id="rId15"/>
     <p:sldId id="419" r:id="rId16"/>
@@ -218,7 +218,7 @@
             <a:fld id="{1EBEDD12-BCD5-485B-BCBC-34BB01D7923C}" type="datetimeFigureOut">
               <a:rPr lang="en-US" smtClean="0"/>
               <a:pPr/>
-              <a:t>1/23/2026</a:t>
+              <a:t>1/24/2026</a:t>
             </a:fld>
             <a:endParaRPr lang="en-US" dirty="0"/>
           </a:p>
@@ -434,7 +434,7 @@
             <a:fld id="{6EE7A52F-9D89-7442-A8E9-48D1527B5F6B}" type="datetimeFigureOut">
               <a:rPr lang="en-US" smtClean="0"/>
               <a:pPr/>
-              <a:t>1/23/2026</a:t>
+              <a:t>1/24/2026</a:t>
             </a:fld>
             <a:endParaRPr lang="en-US" dirty="0"/>
           </a:p>
@@ -1163,6 +1163,122 @@
 </file>
 
 <file path=ppt/notesSlides/notesSlide6.xml><?xml version="1.0" encoding="utf-8"?>
+<p:notes xmlns:a="http://schemas.openxmlformats.org/drawingml/2006/main" xmlns:r="http://schemas.openxmlformats.org/officeDocument/2006/relationships" xmlns:p="http://schemas.openxmlformats.org/presentationml/2006/main">
+  <p:cSld>
+    <p:spTree>
+      <p:nvGrpSpPr>
+        <p:cNvPr id="1" name="">
+          <a:extLst>
+            <a:ext uri="{FF2B5EF4-FFF2-40B4-BE49-F238E27FC236}">
+              <a16:creationId xmlns:a16="http://schemas.microsoft.com/office/drawing/2014/main" id="{CB8932A1-C936-CF67-A673-09CEB499FF85}"/>
+            </a:ext>
+          </a:extLst>
+        </p:cNvPr>
+        <p:cNvGrpSpPr/>
+        <p:nvPr/>
+      </p:nvGrpSpPr>
+      <p:grpSpPr>
+        <a:xfrm>
+          <a:off x="0" y="0"/>
+          <a:ext cx="0" cy="0"/>
+          <a:chOff x="0" y="0"/>
+          <a:chExt cx="0" cy="0"/>
+        </a:xfrm>
+      </p:grpSpPr>
+      <p:sp>
+        <p:nvSpPr>
+          <p:cNvPr id="2" name="Slide Image Placeholder 1">
+            <a:extLst>
+              <a:ext uri="{FF2B5EF4-FFF2-40B4-BE49-F238E27FC236}">
+                <a16:creationId xmlns:a16="http://schemas.microsoft.com/office/drawing/2014/main" id="{FDEC41C0-1F7D-6338-2E81-2DB9CCB8D2A6}"/>
+              </a:ext>
+            </a:extLst>
+          </p:cNvPr>
+          <p:cNvSpPr>
+            <a:spLocks noGrp="1" noRot="1" noChangeAspect="1"/>
+          </p:cNvSpPr>
+          <p:nvPr>
+            <p:ph type="sldImg"/>
+          </p:nvPr>
+        </p:nvSpPr>
+        <p:spPr/>
+        <p:txBody>
+          <a:bodyPr/>
+          <a:lstStyle/>
+          <a:p>
+            <a:endParaRPr lang="en-IN"/>
+          </a:p>
+        </p:txBody>
+      </p:sp>
+      <p:sp>
+        <p:nvSpPr>
+          <p:cNvPr id="3" name="Notes Placeholder 2">
+            <a:extLst>
+              <a:ext uri="{FF2B5EF4-FFF2-40B4-BE49-F238E27FC236}">
+                <a16:creationId xmlns:a16="http://schemas.microsoft.com/office/drawing/2014/main" id="{E2862D1A-24CB-B3F5-7356-F82F2254163F}"/>
+              </a:ext>
+            </a:extLst>
+          </p:cNvPr>
+          <p:cNvSpPr>
+            <a:spLocks noGrp="1"/>
+          </p:cNvSpPr>
+          <p:nvPr>
+            <p:ph type="body" idx="1"/>
+          </p:nvPr>
+        </p:nvSpPr>
+        <p:spPr/>
+        <p:txBody>
+          <a:bodyPr/>
+          <a:lstStyle/>
+          <a:p>
+            <a:endParaRPr lang="en-US" dirty="0"/>
+          </a:p>
+        </p:txBody>
+      </p:sp>
+      <p:sp>
+        <p:nvSpPr>
+          <p:cNvPr id="4" name="Slide Number Placeholder 3">
+            <a:extLst>
+              <a:ext uri="{FF2B5EF4-FFF2-40B4-BE49-F238E27FC236}">
+                <a16:creationId xmlns:a16="http://schemas.microsoft.com/office/drawing/2014/main" id="{77BAFD2A-7FF3-D2C4-FD64-93EDE84621DA}"/>
+              </a:ext>
+            </a:extLst>
+          </p:cNvPr>
+          <p:cNvSpPr>
+            <a:spLocks noGrp="1"/>
+          </p:cNvSpPr>
+          <p:nvPr>
+            <p:ph type="sldNum" sz="quarter" idx="5"/>
+          </p:nvPr>
+        </p:nvSpPr>
+        <p:spPr/>
+        <p:txBody>
+          <a:bodyPr/>
+          <a:lstStyle/>
+          <a:p>
+            <a:fld id="{A89C7E07-3C67-C64C-8DA0-0404F6303970}" type="slidenum">
+              <a:rPr lang="en-US" smtClean="0"/>
+              <a:pPr/>
+              <a:t>7</a:t>
+            </a:fld>
+            <a:endParaRPr lang="en-US" dirty="0"/>
+          </a:p>
+        </p:txBody>
+      </p:sp>
+    </p:spTree>
+    <p:extLst>
+      <p:ext uri="{BB962C8B-B14F-4D97-AF65-F5344CB8AC3E}">
+        <p14:creationId xmlns:p14="http://schemas.microsoft.com/office/powerpoint/2010/main" val="799168838"/>
+      </p:ext>
+    </p:extLst>
+  </p:cSld>
+  <p:clrMapOvr>
+    <a:masterClrMapping/>
+  </p:clrMapOvr>
+</p:notes>
+</file>
+
+<file path=ppt/notesSlides/notesSlide7.xml><?xml version="1.0" encoding="utf-8"?>
 <p:notes xmlns:a="http://schemas.openxmlformats.org/drawingml/2006/main" xmlns:r="http://schemas.openxmlformats.org/officeDocument/2006/relationships" xmlns:p="http://schemas.openxmlformats.org/presentationml/2006/main">
   <p:cSld>
     <p:spTree>
@@ -10275,138 +10391,61 @@
         </p:spPr>
         <p:txBody>
           <a:bodyPr>
-            <a:normAutofit lnSpcReduction="10000"/>
+            <a:normAutofit fontScale="92500" lnSpcReduction="10000"/>
           </a:bodyPr>
           <a:lstStyle/>
           <a:p>
-            <a:pPr>
-              <a:lnSpc>
-                <a:spcPct val="250000"/>
-              </a:lnSpc>
-            </a:pPr>
-            <a:r>
-              <a:rPr lang="en-US" b="1" dirty="0">
-                <a:latin typeface="Times New Roman" panose="02020603050405020304" pitchFamily="18" charset="0"/>
-                <a:cs typeface="Times New Roman" panose="02020603050405020304" pitchFamily="18" charset="0"/>
-              </a:rPr>
-              <a:t>Functional Requirements</a:t>
-            </a:r>
-          </a:p>
-          <a:p>
-            <a:pPr>
-              <a:spcBef>
-                <a:spcPts val="0"/>
-              </a:spcBef>
-            </a:pPr>
-            <a:r>
-              <a:rPr lang="en-US" dirty="0">
-                <a:latin typeface="Times New Roman" panose="02020603050405020304" pitchFamily="18" charset="0"/>
-                <a:cs typeface="Times New Roman" panose="02020603050405020304" pitchFamily="18" charset="0"/>
-              </a:rPr>
-              <a:t>User authentication</a:t>
-            </a:r>
-          </a:p>
-          <a:p>
-            <a:pPr>
-              <a:spcBef>
-                <a:spcPts val="0"/>
-              </a:spcBef>
-            </a:pPr>
-            <a:r>
-              <a:rPr lang="en-US" dirty="0">
-                <a:latin typeface="Times New Roman" panose="02020603050405020304" pitchFamily="18" charset="0"/>
-                <a:cs typeface="Times New Roman" panose="02020603050405020304" pitchFamily="18" charset="0"/>
-              </a:rPr>
-              <a:t>Exam creation and scheduling</a:t>
-            </a:r>
-          </a:p>
-          <a:p>
-            <a:pPr>
-              <a:spcBef>
-                <a:spcPts val="0"/>
-              </a:spcBef>
-            </a:pPr>
-            <a:r>
-              <a:rPr lang="en-US" dirty="0">
-                <a:latin typeface="Times New Roman" panose="02020603050405020304" pitchFamily="18" charset="0"/>
-                <a:cs typeface="Times New Roman" panose="02020603050405020304" pitchFamily="18" charset="0"/>
-              </a:rPr>
-              <a:t>MCQ and coding question support</a:t>
-            </a:r>
-          </a:p>
-          <a:p>
-            <a:pPr>
-              <a:spcBef>
-                <a:spcPts val="0"/>
-              </a:spcBef>
-            </a:pPr>
-            <a:r>
-              <a:rPr lang="en-US" dirty="0">
-                <a:latin typeface="Times New Roman" panose="02020603050405020304" pitchFamily="18" charset="0"/>
-                <a:cs typeface="Times New Roman" panose="02020603050405020304" pitchFamily="18" charset="0"/>
-              </a:rPr>
-              <a:t>Result generation</a:t>
-            </a:r>
-          </a:p>
-          <a:p>
-            <a:r>
-              <a:rPr lang="en-US" b="1" dirty="0">
-                <a:latin typeface="Times New Roman" panose="02020603050405020304" pitchFamily="18" charset="0"/>
-                <a:cs typeface="Times New Roman" panose="02020603050405020304" pitchFamily="18" charset="0"/>
-              </a:rPr>
-              <a:t>Non-Functional Requirements</a:t>
-            </a:r>
-          </a:p>
-          <a:p>
-            <a:r>
-              <a:rPr lang="en-US" dirty="0">
-                <a:latin typeface="Times New Roman" panose="02020603050405020304" pitchFamily="18" charset="0"/>
-                <a:cs typeface="Times New Roman" panose="02020603050405020304" pitchFamily="18" charset="0"/>
-              </a:rPr>
-              <a:t>Security</a:t>
-            </a:r>
-          </a:p>
-          <a:p>
-            <a:pPr>
-              <a:spcBef>
-                <a:spcPts val="0"/>
-              </a:spcBef>
-            </a:pPr>
-            <a:r>
-              <a:rPr lang="en-US" dirty="0">
-                <a:latin typeface="Times New Roman" panose="02020603050405020304" pitchFamily="18" charset="0"/>
-                <a:cs typeface="Times New Roman" panose="02020603050405020304" pitchFamily="18" charset="0"/>
-              </a:rPr>
-              <a:t>Scalability</a:t>
-            </a:r>
-          </a:p>
-          <a:p>
-            <a:pPr>
-              <a:spcBef>
-                <a:spcPts val="0"/>
-              </a:spcBef>
-            </a:pPr>
-            <a:r>
-              <a:rPr lang="en-US" dirty="0">
-                <a:latin typeface="Times New Roman" panose="02020603050405020304" pitchFamily="18" charset="0"/>
-                <a:cs typeface="Times New Roman" panose="02020603050405020304" pitchFamily="18" charset="0"/>
-              </a:rPr>
-              <a:t>Performance</a:t>
-            </a:r>
-          </a:p>
-          <a:p>
-            <a:pPr>
-              <a:spcBef>
-                <a:spcPts val="0"/>
-              </a:spcBef>
-            </a:pPr>
-            <a:r>
-              <a:rPr lang="en-US" dirty="0">
-                <a:latin typeface="Times New Roman" panose="02020603050405020304" pitchFamily="18" charset="0"/>
-                <a:cs typeface="Times New Roman" panose="02020603050405020304" pitchFamily="18" charset="0"/>
-              </a:rPr>
-              <a:t>Usability</a:t>
-            </a:r>
+            <a:r>
+              <a:rPr lang="en-US" b="1" dirty="0"/>
+              <a:t>Workflow Description</a:t>
+            </a:r>
+          </a:p>
+          <a:p>
+            <a:r>
+              <a:rPr lang="en-US" dirty="0"/>
+              <a:t>Admin logs in and creates exam</a:t>
+            </a:r>
+          </a:p>
+          <a:p>
+            <a:r>
+              <a:rPr lang="en-US" dirty="0"/>
+              <a:t>Questions (MCQ &amp; coding) are added</a:t>
+            </a:r>
+          </a:p>
+          <a:p>
+            <a:r>
+              <a:rPr lang="en-US" dirty="0"/>
+              <a:t>Student registers and logs in</a:t>
+            </a:r>
+          </a:p>
+          <a:p>
+            <a:r>
+              <a:rPr lang="en-US" dirty="0"/>
+              <a:t>Student attempts exam within time limit</a:t>
+            </a:r>
+          </a:p>
+          <a:p>
+            <a:r>
+              <a:rPr lang="en-US" dirty="0"/>
+              <a:t>Automatic evaluation is performed</a:t>
+            </a:r>
+          </a:p>
+          <a:p>
+            <a:r>
+              <a:rPr lang="en-US" dirty="0"/>
+              <a:t>Results are generated and displayed</a:t>
+            </a:r>
+          </a:p>
+          <a:p>
+            <a:r>
+              <a:rPr lang="en-US" dirty="0"/>
+              <a:t>📌 </a:t>
+            </a:r>
+            <a:r>
+              <a:rPr lang="en-US" i="1" dirty="0"/>
+              <a:t>Insert Workflow / Flowchart Diagram here</a:t>
+            </a:r>
+            <a:endParaRPr lang="en-US" dirty="0"/>
           </a:p>
         </p:txBody>
       </p:sp>
@@ -10465,6 +10504,42 @@
           </a:p>
         </p:txBody>
       </p:sp>
+      <p:pic>
+        <p:nvPicPr>
+          <p:cNvPr id="4" name="Picture 3">
+            <a:extLst>
+              <a:ext uri="{FF2B5EF4-FFF2-40B4-BE49-F238E27FC236}">
+                <a16:creationId xmlns:a16="http://schemas.microsoft.com/office/drawing/2014/main" id="{17A55C2F-9130-6E77-0F3D-93673C1B5C63}"/>
+              </a:ext>
+            </a:extLst>
+          </p:cNvPr>
+          <p:cNvPicPr>
+            <a:picLocks noChangeAspect="1"/>
+          </p:cNvPicPr>
+          <p:nvPr/>
+        </p:nvPicPr>
+        <p:blipFill>
+          <a:blip r:embed="rId2">
+            <a:extLst>
+              <a:ext uri="{28A0092B-C50C-407E-A947-70E740481C1C}">
+                <a14:useLocalDpi xmlns:a14="http://schemas.microsoft.com/office/drawing/2010/main" val="0"/>
+              </a:ext>
+            </a:extLst>
+          </a:blip>
+          <a:stretch>
+            <a:fillRect/>
+          </a:stretch>
+        </p:blipFill>
+        <p:spPr>
+          <a:xfrm>
+            <a:off x="2883910" y="1924088"/>
+            <a:ext cx="6424180" cy="4655783"/>
+          </a:xfrm>
+          <a:prstGeom prst="rect">
+            <a:avLst/>
+          </a:prstGeom>
+        </p:spPr>
+      </p:pic>
     </p:spTree>
   </p:cSld>
   <p:clrMapOvr>
@@ -10522,42 +10597,6 @@
       </p:sp>
       <p:sp>
         <p:nvSpPr>
-          <p:cNvPr id="3" name="Content Placeholder 2"/>
-          <p:cNvSpPr>
-            <a:spLocks noGrp="1"/>
-          </p:cNvSpPr>
-          <p:nvPr>
-            <p:ph sz="quarter" idx="15"/>
-          </p:nvPr>
-        </p:nvSpPr>
-        <p:spPr>
-          <a:xfrm>
-            <a:off x="594360" y="2676525"/>
-            <a:ext cx="9159240" cy="3597470"/>
-          </a:xfrm>
-        </p:spPr>
-        <p:txBody>
-          <a:bodyPr/>
-          <a:lstStyle/>
-          <a:p>
-            <a:r>
-              <a:rPr lang="en-US" dirty="0"/>
-              <a:t>Process or algorithm involved (Optional)</a:t>
-            </a:r>
-          </a:p>
-          <a:p>
-            <a:endParaRPr lang="en-US" dirty="0"/>
-          </a:p>
-          <a:p>
-            <a:r>
-              <a:rPr lang="en-US" dirty="0"/>
-              <a:t>Testing and Validation</a:t>
-            </a:r>
-          </a:p>
-        </p:txBody>
-      </p:sp>
-      <p:sp>
-        <p:nvSpPr>
           <p:cNvPr id="5" name="Title 1"/>
           <p:cNvSpPr txBox="1">
             <a:spLocks/>
@@ -10566,8 +10605,8 @@
         </p:nvSpPr>
         <p:spPr>
           <a:xfrm>
-            <a:off x="746760" y="430529"/>
-            <a:ext cx="9778365" cy="1494596"/>
+            <a:off x="594360" y="340516"/>
+            <a:ext cx="9778365" cy="723127"/>
           </a:xfrm>
           <a:prstGeom prst="rect">
             <a:avLst/>
@@ -10597,7 +10636,7 @@
               <a:defRPr/>
             </a:pPr>
             <a:r>
-              <a:rPr kumimoji="0" lang="en-US" sz="4400" b="1" i="0" u="none" strike="noStrike" kern="1200" cap="none" spc="100" normalizeH="0" baseline="0" noProof="0">
+              <a:rPr kumimoji="0" lang="en-US" sz="4400" b="1" i="0" u="none" strike="noStrike" kern="1200" cap="none" spc="100" normalizeH="0" baseline="0" noProof="0" dirty="0">
                 <a:ln>
                   <a:noFill/>
                 </a:ln>
@@ -10611,25 +10650,47 @@
                 <a:ea typeface="+mj-ea"/>
                 <a:cs typeface="+mj-cs"/>
               </a:rPr>
-              <a:t>Project management Continued</a:t>
-            </a:r>
-            <a:endParaRPr kumimoji="0" lang="en-US" sz="4400" b="1" i="0" u="none" strike="noStrike" kern="1200" cap="none" spc="100" normalizeH="0" baseline="0" noProof="0" dirty="0">
-              <a:ln>
-                <a:noFill/>
-              </a:ln>
-              <a:solidFill>
-                <a:schemeClr val="bg1"/>
-              </a:solidFill>
-              <a:effectLst/>
-              <a:uLnTx/>
-              <a:uFillTx/>
-              <a:latin typeface="+mj-lt"/>
-              <a:ea typeface="+mj-ea"/>
-              <a:cs typeface="+mj-cs"/>
-            </a:endParaRPr>
+              <a:t>Project management</a:t>
+            </a:r>
           </a:p>
         </p:txBody>
       </p:sp>
+      <p:pic>
+        <p:nvPicPr>
+          <p:cNvPr id="8" name="Picture 7">
+            <a:extLst>
+              <a:ext uri="{FF2B5EF4-FFF2-40B4-BE49-F238E27FC236}">
+                <a16:creationId xmlns:a16="http://schemas.microsoft.com/office/drawing/2014/main" id="{BA4B5668-0259-1A3D-3AA2-12BC3001B72B}"/>
+              </a:ext>
+            </a:extLst>
+          </p:cNvPr>
+          <p:cNvPicPr>
+            <a:picLocks noChangeAspect="1"/>
+          </p:cNvPicPr>
+          <p:nvPr/>
+        </p:nvPicPr>
+        <p:blipFill>
+          <a:blip r:embed="rId2">
+            <a:extLst>
+              <a:ext uri="{28A0092B-C50C-407E-A947-70E740481C1C}">
+                <a14:useLocalDpi xmlns:a14="http://schemas.microsoft.com/office/drawing/2010/main" val="0"/>
+              </a:ext>
+            </a:extLst>
+          </a:blip>
+          <a:stretch>
+            <a:fillRect/>
+          </a:stretch>
+        </p:blipFill>
+        <p:spPr>
+          <a:xfrm>
+            <a:off x="304801" y="1201998"/>
+            <a:ext cx="10067924" cy="5377873"/>
+          </a:xfrm>
+          <a:prstGeom prst="rect">
+            <a:avLst/>
+          </a:prstGeom>
+        </p:spPr>
+      </p:pic>
     </p:spTree>
   </p:cSld>
   <p:clrMapOvr>
@@ -10684,7 +10745,13 @@
       </p:sp>
       <p:sp>
         <p:nvSpPr>
-          <p:cNvPr id="4" name="Content Placeholder 3"/>
+          <p:cNvPr id="5" name="Content Placeholder 4">
+            <a:extLst>
+              <a:ext uri="{FF2B5EF4-FFF2-40B4-BE49-F238E27FC236}">
+                <a16:creationId xmlns:a16="http://schemas.microsoft.com/office/drawing/2014/main" id="{E9DFBD4A-339F-6ADC-4E57-496CAFCB341F}"/>
+              </a:ext>
+            </a:extLst>
+          </p:cNvPr>
           <p:cNvSpPr>
             <a:spLocks noGrp="1"/>
           </p:cNvSpPr>
@@ -10692,28 +10759,12 @@
             <p:ph sz="quarter" idx="16"/>
           </p:nvPr>
         </p:nvSpPr>
-        <p:spPr>
-          <a:xfrm>
-            <a:off x="1233056" y="2676525"/>
-            <a:ext cx="9139670" cy="3597470"/>
-          </a:xfrm>
-        </p:spPr>
+        <p:spPr/>
         <p:txBody>
           <a:bodyPr/>
           <a:lstStyle/>
           <a:p>
-            <a:r>
-              <a:rPr lang="en-US" dirty="0"/>
-              <a:t>Snap shots in chronological order with </a:t>
-            </a:r>
-            <a:r>
-              <a:rPr lang="en-US" b="1" dirty="0"/>
-              <a:t>brief explanation mandatory</a:t>
-            </a:r>
-            <a:r>
-              <a:rPr lang="en-US" dirty="0"/>
-              <a:t>/ analysis of the results.</a:t>
-            </a:r>
+            <a:endParaRPr lang="en-IN"/>
           </a:p>
         </p:txBody>
       </p:sp>
@@ -12789,61 +12840,832 @@
           <a:lstStyle/>
           <a:p>
             <a:r>
-              <a:rPr lang="en-US" dirty="0"/>
+              <a:rPr lang="en-US" dirty="0">
+                <a:latin typeface="Times New Roman" panose="02020603050405020304" pitchFamily="18" charset="0"/>
+                <a:cs typeface="Times New Roman" panose="02020603050405020304" pitchFamily="18" charset="0"/>
+              </a:rPr>
               <a:t>Literature Survey (2 or 3 slides) </a:t>
             </a:r>
           </a:p>
         </p:txBody>
       </p:sp>
-      <p:sp>
-        <p:nvSpPr>
-          <p:cNvPr id="5" name="Content Placeholder 4"/>
-          <p:cNvSpPr>
-            <a:spLocks noGrp="1"/>
-          </p:cNvSpPr>
+      <p:graphicFrame>
+        <p:nvGraphicFramePr>
+          <p:cNvPr id="6" name="Table 5">
+            <a:extLst>
+              <a:ext uri="{FF2B5EF4-FFF2-40B4-BE49-F238E27FC236}">
+                <a16:creationId xmlns:a16="http://schemas.microsoft.com/office/drawing/2014/main" id="{81D27EB8-4830-4ECB-8BD8-A42B69C9BDD2}"/>
+              </a:ext>
+            </a:extLst>
+          </p:cNvPr>
+          <p:cNvGraphicFramePr>
+            <a:graphicFrameLocks noGrp="1"/>
+          </p:cNvGraphicFramePr>
           <p:nvPr>
-            <p:ph sz="quarter" idx="15"/>
+            <p:extLst>
+              <p:ext uri="{D42A27DB-BD31-4B8C-83A1-F6EECF244321}">
+                <p14:modId xmlns:p14="http://schemas.microsoft.com/office/powerpoint/2010/main" val="607747126"/>
+              </p:ext>
+            </p:extLst>
           </p:nvPr>
-        </p:nvSpPr>
-        <p:spPr>
-          <a:xfrm>
-            <a:off x="1508760" y="2690380"/>
-            <a:ext cx="9408622" cy="3597470"/>
-          </a:xfrm>
-        </p:spPr>
-        <p:txBody>
-          <a:bodyPr/>
-          <a:lstStyle/>
-          <a:p>
-            <a:pPr>
-              <a:buFont typeface="Arial" pitchFamily="34" charset="0"/>
-              <a:buChar char="•"/>
-            </a:pPr>
-            <a:r>
-              <a:rPr lang="en-US" b="1" dirty="0"/>
-              <a:t> </a:t>
-            </a:r>
-            <a:r>
-              <a:rPr lang="en-US" dirty="0"/>
-              <a:t>A summary (table form) of the publication’s main points.</a:t>
-            </a:r>
-          </a:p>
-          <a:p>
-            <a:pPr>
-              <a:buFont typeface="Arial" pitchFamily="34" charset="0"/>
-              <a:buChar char="•"/>
-            </a:pPr>
-            <a:r>
-              <a:rPr lang="en-US" b="1" dirty="0"/>
-              <a:t> </a:t>
-            </a:r>
-            <a:r>
-              <a:rPr lang="en-US" dirty="0"/>
-              <a:t>A discussion of gaps identified in research used for the proposed project.</a:t>
-            </a:r>
-          </a:p>
-        </p:txBody>
-      </p:sp>
+        </p:nvGraphicFramePr>
+        <p:xfrm>
+          <a:off x="593726" y="2401094"/>
+          <a:ext cx="10382248" cy="3505200"/>
+        </p:xfrm>
+        <a:graphic>
+          <a:graphicData uri="http://schemas.openxmlformats.org/drawingml/2006/table">
+            <a:tbl>
+              <a:tblPr/>
+              <a:tblGrid>
+                <a:gridCol w="2595562">
+                  <a:extLst>
+                    <a:ext uri="{9D8B030D-6E8A-4147-A177-3AD203B41FA5}">
+                      <a16:colId xmlns:a16="http://schemas.microsoft.com/office/drawing/2014/main" val="2422882718"/>
+                    </a:ext>
+                  </a:extLst>
+                </a:gridCol>
+                <a:gridCol w="2595562">
+                  <a:extLst>
+                    <a:ext uri="{9D8B030D-6E8A-4147-A177-3AD203B41FA5}">
+                      <a16:colId xmlns:a16="http://schemas.microsoft.com/office/drawing/2014/main" val="1367803024"/>
+                    </a:ext>
+                  </a:extLst>
+                </a:gridCol>
+                <a:gridCol w="2595562">
+                  <a:extLst>
+                    <a:ext uri="{9D8B030D-6E8A-4147-A177-3AD203B41FA5}">
+                      <a16:colId xmlns:a16="http://schemas.microsoft.com/office/drawing/2014/main" val="2829988676"/>
+                    </a:ext>
+                  </a:extLst>
+                </a:gridCol>
+                <a:gridCol w="2595562">
+                  <a:extLst>
+                    <a:ext uri="{9D8B030D-6E8A-4147-A177-3AD203B41FA5}">
+                      <a16:colId xmlns:a16="http://schemas.microsoft.com/office/drawing/2014/main" val="3641703757"/>
+                    </a:ext>
+                  </a:extLst>
+                </a:gridCol>
+              </a:tblGrid>
+              <a:tr h="365760">
+                <a:tc>
+                  <a:txBody>
+                    <a:bodyPr/>
+                    <a:lstStyle/>
+                    <a:p>
+                      <a:pPr>
+                        <a:buNone/>
+                      </a:pPr>
+                      <a:r>
+                        <a:rPr lang="en-IN" sz="2000">
+                          <a:solidFill>
+                            <a:schemeClr val="bg1"/>
+                          </a:solidFill>
+                          <a:latin typeface="Times New Roman" panose="02020603050405020304" pitchFamily="18" charset="0"/>
+                          <a:cs typeface="Times New Roman" panose="02020603050405020304" pitchFamily="18" charset="0"/>
+                        </a:rPr>
+                        <a:t>Author / Year</a:t>
+                      </a:r>
+                    </a:p>
+                  </a:txBody>
+                  <a:tcPr anchor="ctr">
+                    <a:lnL>
+                      <a:noFill/>
+                    </a:lnL>
+                    <a:lnR>
+                      <a:noFill/>
+                    </a:lnR>
+                    <a:lnT>
+                      <a:noFill/>
+                    </a:lnT>
+                    <a:lnB>
+                      <a:noFill/>
+                    </a:lnB>
+                    <a:noFill/>
+                  </a:tcPr>
+                </a:tc>
+                <a:tc>
+                  <a:txBody>
+                    <a:bodyPr/>
+                    <a:lstStyle/>
+                    <a:p>
+                      <a:pPr>
+                        <a:buNone/>
+                      </a:pPr>
+                      <a:r>
+                        <a:rPr lang="en-IN" sz="2000">
+                          <a:solidFill>
+                            <a:schemeClr val="bg1"/>
+                          </a:solidFill>
+                          <a:latin typeface="Times New Roman" panose="02020603050405020304" pitchFamily="18" charset="0"/>
+                          <a:cs typeface="Times New Roman" panose="02020603050405020304" pitchFamily="18" charset="0"/>
+                        </a:rPr>
+                        <a:t>Title / System</a:t>
+                      </a:r>
+                    </a:p>
+                  </a:txBody>
+                  <a:tcPr anchor="ctr">
+                    <a:lnL>
+                      <a:noFill/>
+                    </a:lnL>
+                    <a:lnR>
+                      <a:noFill/>
+                    </a:lnR>
+                    <a:lnT>
+                      <a:noFill/>
+                    </a:lnT>
+                    <a:lnB>
+                      <a:noFill/>
+                    </a:lnB>
+                    <a:noFill/>
+                  </a:tcPr>
+                </a:tc>
+                <a:tc>
+                  <a:txBody>
+                    <a:bodyPr/>
+                    <a:lstStyle/>
+                    <a:p>
+                      <a:pPr>
+                        <a:buNone/>
+                      </a:pPr>
+                      <a:r>
+                        <a:rPr lang="en-IN" sz="2000">
+                          <a:solidFill>
+                            <a:schemeClr val="bg1"/>
+                          </a:solidFill>
+                          <a:latin typeface="Times New Roman" panose="02020603050405020304" pitchFamily="18" charset="0"/>
+                          <a:cs typeface="Times New Roman" panose="02020603050405020304" pitchFamily="18" charset="0"/>
+                        </a:rPr>
+                        <a:t>Key Contributions</a:t>
+                      </a:r>
+                    </a:p>
+                  </a:txBody>
+                  <a:tcPr anchor="ctr">
+                    <a:lnL>
+                      <a:noFill/>
+                    </a:lnL>
+                    <a:lnR>
+                      <a:noFill/>
+                    </a:lnR>
+                    <a:lnT>
+                      <a:noFill/>
+                    </a:lnT>
+                    <a:lnB>
+                      <a:noFill/>
+                    </a:lnB>
+                    <a:noFill/>
+                  </a:tcPr>
+                </a:tc>
+                <a:tc>
+                  <a:txBody>
+                    <a:bodyPr/>
+                    <a:lstStyle/>
+                    <a:p>
+                      <a:pPr>
+                        <a:buNone/>
+                      </a:pPr>
+                      <a:r>
+                        <a:rPr lang="en-IN" sz="2000">
+                          <a:solidFill>
+                            <a:schemeClr val="bg1"/>
+                          </a:solidFill>
+                          <a:latin typeface="Times New Roman" panose="02020603050405020304" pitchFamily="18" charset="0"/>
+                          <a:cs typeface="Times New Roman" panose="02020603050405020304" pitchFamily="18" charset="0"/>
+                        </a:rPr>
+                        <a:t>Limitations</a:t>
+                      </a:r>
+                    </a:p>
+                  </a:txBody>
+                  <a:tcPr anchor="ctr">
+                    <a:lnL>
+                      <a:noFill/>
+                    </a:lnL>
+                    <a:lnR>
+                      <a:noFill/>
+                    </a:lnR>
+                    <a:lnT>
+                      <a:noFill/>
+                    </a:lnT>
+                    <a:lnB>
+                      <a:noFill/>
+                    </a:lnB>
+                    <a:noFill/>
+                  </a:tcPr>
+                </a:tc>
+                <a:extLst>
+                  <a:ext uri="{0D108BD9-81ED-4DB2-BD59-A6C34878D82A}">
+                    <a16:rowId xmlns:a16="http://schemas.microsoft.com/office/drawing/2014/main" val="3750406849"/>
+                  </a:ext>
+                </a:extLst>
+              </a:tr>
+              <a:tr h="914400">
+                <a:tc>
+                  <a:txBody>
+                    <a:bodyPr/>
+                    <a:lstStyle/>
+                    <a:p>
+                      <a:pPr>
+                        <a:buNone/>
+                      </a:pPr>
+                      <a:r>
+                        <a:rPr lang="en-IN" sz="2000" dirty="0">
+                          <a:solidFill>
+                            <a:schemeClr val="bg1"/>
+                          </a:solidFill>
+                          <a:latin typeface="Times New Roman" panose="02020603050405020304" pitchFamily="18" charset="0"/>
+                          <a:cs typeface="Times New Roman" panose="02020603050405020304" pitchFamily="18" charset="0"/>
+                        </a:rPr>
+                        <a:t>Sharma et al., 2021</a:t>
+                      </a:r>
+                    </a:p>
+                  </a:txBody>
+                  <a:tcPr anchor="ctr">
+                    <a:lnL>
+                      <a:noFill/>
+                    </a:lnL>
+                    <a:lnR>
+                      <a:noFill/>
+                    </a:lnR>
+                    <a:lnT>
+                      <a:noFill/>
+                    </a:lnT>
+                    <a:lnB>
+                      <a:noFill/>
+                    </a:lnB>
+                    <a:noFill/>
+                  </a:tcPr>
+                </a:tc>
+                <a:tc>
+                  <a:txBody>
+                    <a:bodyPr/>
+                    <a:lstStyle/>
+                    <a:p>
+                      <a:pPr>
+                        <a:buNone/>
+                      </a:pPr>
+                      <a:r>
+                        <a:rPr lang="en-IN" sz="2000" dirty="0">
+                          <a:solidFill>
+                            <a:schemeClr val="bg1"/>
+                          </a:solidFill>
+                          <a:latin typeface="Times New Roman" panose="02020603050405020304" pitchFamily="18" charset="0"/>
+                          <a:cs typeface="Times New Roman" panose="02020603050405020304" pitchFamily="18" charset="0"/>
+                        </a:rPr>
+                        <a:t>Online Examination System</a:t>
+                      </a:r>
+                    </a:p>
+                  </a:txBody>
+                  <a:tcPr anchor="ctr">
+                    <a:lnL>
+                      <a:noFill/>
+                    </a:lnL>
+                    <a:lnR>
+                      <a:noFill/>
+                    </a:lnR>
+                    <a:lnT>
+                      <a:noFill/>
+                    </a:lnT>
+                    <a:lnB>
+                      <a:noFill/>
+                    </a:lnB>
+                    <a:noFill/>
+                  </a:tcPr>
+                </a:tc>
+                <a:tc>
+                  <a:txBody>
+                    <a:bodyPr/>
+                    <a:lstStyle/>
+                    <a:p>
+                      <a:pPr>
+                        <a:buNone/>
+                      </a:pPr>
+                      <a:r>
+                        <a:rPr lang="en-US" sz="2000">
+                          <a:solidFill>
+                            <a:schemeClr val="bg1"/>
+                          </a:solidFill>
+                          <a:latin typeface="Times New Roman" panose="02020603050405020304" pitchFamily="18" charset="0"/>
+                          <a:cs typeface="Times New Roman" panose="02020603050405020304" pitchFamily="18" charset="0"/>
+                        </a:rPr>
+                        <a:t>Automated MCQ evaluation, role-based login</a:t>
+                      </a:r>
+                    </a:p>
+                  </a:txBody>
+                  <a:tcPr anchor="ctr">
+                    <a:lnL>
+                      <a:noFill/>
+                    </a:lnL>
+                    <a:lnR>
+                      <a:noFill/>
+                    </a:lnR>
+                    <a:lnT>
+                      <a:noFill/>
+                    </a:lnT>
+                    <a:lnB>
+                      <a:noFill/>
+                    </a:lnB>
+                    <a:noFill/>
+                  </a:tcPr>
+                </a:tc>
+                <a:tc>
+                  <a:txBody>
+                    <a:bodyPr/>
+                    <a:lstStyle/>
+                    <a:p>
+                      <a:pPr>
+                        <a:buNone/>
+                      </a:pPr>
+                      <a:r>
+                        <a:rPr lang="en-IN" sz="2000">
+                          <a:solidFill>
+                            <a:schemeClr val="bg1"/>
+                          </a:solidFill>
+                          <a:latin typeface="Times New Roman" panose="02020603050405020304" pitchFamily="18" charset="0"/>
+                          <a:cs typeface="Times New Roman" panose="02020603050405020304" pitchFamily="18" charset="0"/>
+                        </a:rPr>
+                        <a:t>No coding assessment</a:t>
+                      </a:r>
+                    </a:p>
+                  </a:txBody>
+                  <a:tcPr anchor="ctr">
+                    <a:lnL>
+                      <a:noFill/>
+                    </a:lnL>
+                    <a:lnR>
+                      <a:noFill/>
+                    </a:lnR>
+                    <a:lnT>
+                      <a:noFill/>
+                    </a:lnT>
+                    <a:lnB>
+                      <a:noFill/>
+                    </a:lnB>
+                    <a:noFill/>
+                  </a:tcPr>
+                </a:tc>
+                <a:extLst>
+                  <a:ext uri="{0D108BD9-81ED-4DB2-BD59-A6C34878D82A}">
+                    <a16:rowId xmlns:a16="http://schemas.microsoft.com/office/drawing/2014/main" val="2962087830"/>
+                  </a:ext>
+                </a:extLst>
+              </a:tr>
+              <a:tr h="640080">
+                <a:tc>
+                  <a:txBody>
+                    <a:bodyPr/>
+                    <a:lstStyle/>
+                    <a:p>
+                      <a:pPr>
+                        <a:buNone/>
+                      </a:pPr>
+                      <a:r>
+                        <a:rPr lang="en-IN" sz="2000" dirty="0">
+                          <a:solidFill>
+                            <a:schemeClr val="bg1"/>
+                          </a:solidFill>
+                          <a:latin typeface="Times New Roman" panose="02020603050405020304" pitchFamily="18" charset="0"/>
+                          <a:cs typeface="Times New Roman" panose="02020603050405020304" pitchFamily="18" charset="0"/>
+                        </a:rPr>
+                        <a:t>Kumar &amp; Singh, 2022</a:t>
+                      </a:r>
+                    </a:p>
+                  </a:txBody>
+                  <a:tcPr anchor="ctr">
+                    <a:lnL>
+                      <a:noFill/>
+                    </a:lnL>
+                    <a:lnR>
+                      <a:noFill/>
+                    </a:lnR>
+                    <a:lnT>
+                      <a:noFill/>
+                    </a:lnT>
+                    <a:lnB>
+                      <a:noFill/>
+                    </a:lnB>
+                    <a:noFill/>
+                  </a:tcPr>
+                </a:tc>
+                <a:tc>
+                  <a:txBody>
+                    <a:bodyPr/>
+                    <a:lstStyle/>
+                    <a:p>
+                      <a:pPr>
+                        <a:buNone/>
+                      </a:pPr>
+                      <a:r>
+                        <a:rPr lang="en-IN" sz="2000">
+                          <a:solidFill>
+                            <a:schemeClr val="bg1"/>
+                          </a:solidFill>
+                          <a:latin typeface="Times New Roman" panose="02020603050405020304" pitchFamily="18" charset="0"/>
+                          <a:cs typeface="Times New Roman" panose="02020603050405020304" pitchFamily="18" charset="0"/>
+                        </a:rPr>
+                        <a:t>Web-Based Assessment Tool</a:t>
+                      </a:r>
+                    </a:p>
+                  </a:txBody>
+                  <a:tcPr anchor="ctr">
+                    <a:lnL>
+                      <a:noFill/>
+                    </a:lnL>
+                    <a:lnR>
+                      <a:noFill/>
+                    </a:lnR>
+                    <a:lnT>
+                      <a:noFill/>
+                    </a:lnT>
+                    <a:lnB>
+                      <a:noFill/>
+                    </a:lnB>
+                    <a:noFill/>
+                  </a:tcPr>
+                </a:tc>
+                <a:tc>
+                  <a:txBody>
+                    <a:bodyPr/>
+                    <a:lstStyle/>
+                    <a:p>
+                      <a:pPr>
+                        <a:buNone/>
+                      </a:pPr>
+                      <a:r>
+                        <a:rPr lang="en-IN" sz="2000">
+                          <a:solidFill>
+                            <a:schemeClr val="bg1"/>
+                          </a:solidFill>
+                          <a:latin typeface="Times New Roman" panose="02020603050405020304" pitchFamily="18" charset="0"/>
+                          <a:cs typeface="Times New Roman" panose="02020603050405020304" pitchFamily="18" charset="0"/>
+                        </a:rPr>
+                        <a:t>Exam scheduling, result analytics</a:t>
+                      </a:r>
+                    </a:p>
+                  </a:txBody>
+                  <a:tcPr anchor="ctr">
+                    <a:lnL>
+                      <a:noFill/>
+                    </a:lnL>
+                    <a:lnR>
+                      <a:noFill/>
+                    </a:lnR>
+                    <a:lnT>
+                      <a:noFill/>
+                    </a:lnT>
+                    <a:lnB>
+                      <a:noFill/>
+                    </a:lnB>
+                    <a:noFill/>
+                  </a:tcPr>
+                </a:tc>
+                <a:tc>
+                  <a:txBody>
+                    <a:bodyPr/>
+                    <a:lstStyle/>
+                    <a:p>
+                      <a:pPr>
+                        <a:buNone/>
+                      </a:pPr>
+                      <a:r>
+                        <a:rPr lang="en-IN" sz="2000">
+                          <a:solidFill>
+                            <a:schemeClr val="bg1"/>
+                          </a:solidFill>
+                          <a:latin typeface="Times New Roman" panose="02020603050405020304" pitchFamily="18" charset="0"/>
+                          <a:cs typeface="Times New Roman" panose="02020603050405020304" pitchFamily="18" charset="0"/>
+                        </a:rPr>
+                        <a:t>Limited scalability</a:t>
+                      </a:r>
+                    </a:p>
+                  </a:txBody>
+                  <a:tcPr anchor="ctr">
+                    <a:lnL>
+                      <a:noFill/>
+                    </a:lnL>
+                    <a:lnR>
+                      <a:noFill/>
+                    </a:lnR>
+                    <a:lnT>
+                      <a:noFill/>
+                    </a:lnT>
+                    <a:lnB>
+                      <a:noFill/>
+                    </a:lnB>
+                    <a:noFill/>
+                  </a:tcPr>
+                </a:tc>
+                <a:extLst>
+                  <a:ext uri="{0D108BD9-81ED-4DB2-BD59-A6C34878D82A}">
+                    <a16:rowId xmlns:a16="http://schemas.microsoft.com/office/drawing/2014/main" val="3928545149"/>
+                  </a:ext>
+                </a:extLst>
+              </a:tr>
+              <a:tr h="640080">
+                <a:tc>
+                  <a:txBody>
+                    <a:bodyPr/>
+                    <a:lstStyle/>
+                    <a:p>
+                      <a:pPr>
+                        <a:buNone/>
+                      </a:pPr>
+                      <a:r>
+                        <a:rPr lang="en-IN" sz="2000">
+                          <a:solidFill>
+                            <a:schemeClr val="bg1"/>
+                          </a:solidFill>
+                          <a:latin typeface="Times New Roman" panose="02020603050405020304" pitchFamily="18" charset="0"/>
+                          <a:cs typeface="Times New Roman" panose="02020603050405020304" pitchFamily="18" charset="0"/>
+                        </a:rPr>
+                        <a:t>Patel et al., 2022</a:t>
+                      </a:r>
+                    </a:p>
+                  </a:txBody>
+                  <a:tcPr anchor="ctr">
+                    <a:lnL>
+                      <a:noFill/>
+                    </a:lnL>
+                    <a:lnR>
+                      <a:noFill/>
+                    </a:lnR>
+                    <a:lnT>
+                      <a:noFill/>
+                    </a:lnT>
+                    <a:lnB>
+                      <a:noFill/>
+                    </a:lnB>
+                    <a:noFill/>
+                  </a:tcPr>
+                </a:tc>
+                <a:tc>
+                  <a:txBody>
+                    <a:bodyPr/>
+                    <a:lstStyle/>
+                    <a:p>
+                      <a:pPr>
+                        <a:buNone/>
+                      </a:pPr>
+                      <a:r>
+                        <a:rPr lang="en-IN" sz="2000">
+                          <a:solidFill>
+                            <a:schemeClr val="bg1"/>
+                          </a:solidFill>
+                          <a:latin typeface="Times New Roman" panose="02020603050405020304" pitchFamily="18" charset="0"/>
+                          <a:cs typeface="Times New Roman" panose="02020603050405020304" pitchFamily="18" charset="0"/>
+                        </a:rPr>
+                        <a:t>Cloud-Based Exam Platform</a:t>
+                      </a:r>
+                    </a:p>
+                  </a:txBody>
+                  <a:tcPr anchor="ctr">
+                    <a:lnL>
+                      <a:noFill/>
+                    </a:lnL>
+                    <a:lnR>
+                      <a:noFill/>
+                    </a:lnR>
+                    <a:lnT>
+                      <a:noFill/>
+                    </a:lnT>
+                    <a:lnB>
+                      <a:noFill/>
+                    </a:lnB>
+                    <a:noFill/>
+                  </a:tcPr>
+                </a:tc>
+                <a:tc>
+                  <a:txBody>
+                    <a:bodyPr/>
+                    <a:lstStyle/>
+                    <a:p>
+                      <a:pPr>
+                        <a:buNone/>
+                      </a:pPr>
+                      <a:r>
+                        <a:rPr lang="en-IN" sz="2000">
+                          <a:solidFill>
+                            <a:schemeClr val="bg1"/>
+                          </a:solidFill>
+                          <a:latin typeface="Times New Roman" panose="02020603050405020304" pitchFamily="18" charset="0"/>
+                          <a:cs typeface="Times New Roman" panose="02020603050405020304" pitchFamily="18" charset="0"/>
+                        </a:rPr>
+                        <a:t>Secure authentication, cloud storage</a:t>
+                      </a:r>
+                    </a:p>
+                  </a:txBody>
+                  <a:tcPr anchor="ctr">
+                    <a:lnL>
+                      <a:noFill/>
+                    </a:lnL>
+                    <a:lnR>
+                      <a:noFill/>
+                    </a:lnR>
+                    <a:lnT>
+                      <a:noFill/>
+                    </a:lnT>
+                    <a:lnB>
+                      <a:noFill/>
+                    </a:lnB>
+                    <a:noFill/>
+                  </a:tcPr>
+                </a:tc>
+                <a:tc>
+                  <a:txBody>
+                    <a:bodyPr/>
+                    <a:lstStyle/>
+                    <a:p>
+                      <a:pPr>
+                        <a:buNone/>
+                      </a:pPr>
+                      <a:r>
+                        <a:rPr lang="en-IN" sz="2000">
+                          <a:solidFill>
+                            <a:schemeClr val="bg1"/>
+                          </a:solidFill>
+                          <a:latin typeface="Times New Roman" panose="02020603050405020304" pitchFamily="18" charset="0"/>
+                          <a:cs typeface="Times New Roman" panose="02020603050405020304" pitchFamily="18" charset="0"/>
+                        </a:rPr>
+                        <a:t>High operational cost</a:t>
+                      </a:r>
+                    </a:p>
+                  </a:txBody>
+                  <a:tcPr anchor="ctr">
+                    <a:lnL>
+                      <a:noFill/>
+                    </a:lnL>
+                    <a:lnR>
+                      <a:noFill/>
+                    </a:lnR>
+                    <a:lnT>
+                      <a:noFill/>
+                    </a:lnT>
+                    <a:lnB>
+                      <a:noFill/>
+                    </a:lnB>
+                    <a:noFill/>
+                  </a:tcPr>
+                </a:tc>
+                <a:extLst>
+                  <a:ext uri="{0D108BD9-81ED-4DB2-BD59-A6C34878D82A}">
+                    <a16:rowId xmlns:a16="http://schemas.microsoft.com/office/drawing/2014/main" val="3958914893"/>
+                  </a:ext>
+                </a:extLst>
+              </a:tr>
+              <a:tr h="640080">
+                <a:tc>
+                  <a:txBody>
+                    <a:bodyPr/>
+                    <a:lstStyle/>
+                    <a:p>
+                      <a:pPr>
+                        <a:buNone/>
+                      </a:pPr>
+                      <a:r>
+                        <a:rPr lang="en-IN" sz="2000">
+                          <a:solidFill>
+                            <a:schemeClr val="bg1"/>
+                          </a:solidFill>
+                          <a:latin typeface="Times New Roman" panose="02020603050405020304" pitchFamily="18" charset="0"/>
+                          <a:cs typeface="Times New Roman" panose="02020603050405020304" pitchFamily="18" charset="0"/>
+                        </a:rPr>
+                        <a:t>Li et al., 2023</a:t>
+                      </a:r>
+                    </a:p>
+                  </a:txBody>
+                  <a:tcPr anchor="ctr">
+                    <a:lnL>
+                      <a:noFill/>
+                    </a:lnL>
+                    <a:lnR>
+                      <a:noFill/>
+                    </a:lnR>
+                    <a:lnT>
+                      <a:noFill/>
+                    </a:lnT>
+                    <a:lnB>
+                      <a:noFill/>
+                    </a:lnB>
+                    <a:noFill/>
+                  </a:tcPr>
+                </a:tc>
+                <a:tc>
+                  <a:txBody>
+                    <a:bodyPr/>
+                    <a:lstStyle/>
+                    <a:p>
+                      <a:pPr>
+                        <a:buNone/>
+                      </a:pPr>
+                      <a:r>
+                        <a:rPr lang="en-IN" sz="2000">
+                          <a:solidFill>
+                            <a:schemeClr val="bg1"/>
+                          </a:solidFill>
+                          <a:latin typeface="Times New Roman" panose="02020603050405020304" pitchFamily="18" charset="0"/>
+                          <a:cs typeface="Times New Roman" panose="02020603050405020304" pitchFamily="18" charset="0"/>
+                        </a:rPr>
+                        <a:t>Smart Online Testing System</a:t>
+                      </a:r>
+                    </a:p>
+                  </a:txBody>
+                  <a:tcPr anchor="ctr">
+                    <a:lnL>
+                      <a:noFill/>
+                    </a:lnL>
+                    <a:lnR>
+                      <a:noFill/>
+                    </a:lnR>
+                    <a:lnT>
+                      <a:noFill/>
+                    </a:lnT>
+                    <a:lnB>
+                      <a:noFill/>
+                    </a:lnB>
+                    <a:noFill/>
+                  </a:tcPr>
+                </a:tc>
+                <a:tc>
+                  <a:txBody>
+                    <a:bodyPr/>
+                    <a:lstStyle/>
+                    <a:p>
+                      <a:pPr>
+                        <a:buNone/>
+                      </a:pPr>
+                      <a:r>
+                        <a:rPr lang="en-IN" sz="2000">
+                          <a:solidFill>
+                            <a:schemeClr val="bg1"/>
+                          </a:solidFill>
+                          <a:latin typeface="Times New Roman" panose="02020603050405020304" pitchFamily="18" charset="0"/>
+                          <a:cs typeface="Times New Roman" panose="02020603050405020304" pitchFamily="18" charset="0"/>
+                        </a:rPr>
+                        <a:t>Timer-based exams, randomized questions</a:t>
+                      </a:r>
+                    </a:p>
+                  </a:txBody>
+                  <a:tcPr anchor="ctr">
+                    <a:lnL>
+                      <a:noFill/>
+                    </a:lnL>
+                    <a:lnR>
+                      <a:noFill/>
+                    </a:lnR>
+                    <a:lnT>
+                      <a:noFill/>
+                    </a:lnT>
+                    <a:lnB>
+                      <a:noFill/>
+                    </a:lnB>
+                    <a:noFill/>
+                  </a:tcPr>
+                </a:tc>
+                <a:tc>
+                  <a:txBody>
+                    <a:bodyPr/>
+                    <a:lstStyle/>
+                    <a:p>
+                      <a:pPr>
+                        <a:buNone/>
+                      </a:pPr>
+                      <a:r>
+                        <a:rPr lang="en-IN" sz="2000" dirty="0">
+                          <a:solidFill>
+                            <a:schemeClr val="bg1"/>
+                          </a:solidFill>
+                          <a:latin typeface="Times New Roman" panose="02020603050405020304" pitchFamily="18" charset="0"/>
+                          <a:cs typeface="Times New Roman" panose="02020603050405020304" pitchFamily="18" charset="0"/>
+                        </a:rPr>
+                        <a:t>Poor UI usability</a:t>
+                      </a:r>
+                    </a:p>
+                  </a:txBody>
+                  <a:tcPr anchor="ctr">
+                    <a:lnL>
+                      <a:noFill/>
+                    </a:lnL>
+                    <a:lnR>
+                      <a:noFill/>
+                    </a:lnR>
+                    <a:lnT>
+                      <a:noFill/>
+                    </a:lnT>
+                    <a:lnB>
+                      <a:noFill/>
+                    </a:lnB>
+                    <a:noFill/>
+                  </a:tcPr>
+                </a:tc>
+                <a:extLst>
+                  <a:ext uri="{0D108BD9-81ED-4DB2-BD59-A6C34878D82A}">
+                    <a16:rowId xmlns:a16="http://schemas.microsoft.com/office/drawing/2014/main" val="2210017027"/>
+                  </a:ext>
+                </a:extLst>
+              </a:tr>
+            </a:tbl>
+          </a:graphicData>
+        </a:graphic>
+      </p:graphicFrame>
     </p:spTree>
     <p:extLst>
       <p:ext uri="{BB962C8B-B14F-4D97-AF65-F5344CB8AC3E}">
@@ -12858,6 +13680,895 @@
 </file>
 
 <file path=ppt/slides/slide7.xml><?xml version="1.0" encoding="utf-8"?>
+<p:sld xmlns:a="http://schemas.openxmlformats.org/drawingml/2006/main" xmlns:r="http://schemas.openxmlformats.org/officeDocument/2006/relationships" xmlns:p="http://schemas.openxmlformats.org/presentationml/2006/main">
+  <p:cSld>
+    <p:spTree>
+      <p:nvGrpSpPr>
+        <p:cNvPr id="1" name="">
+          <a:extLst>
+            <a:ext uri="{FF2B5EF4-FFF2-40B4-BE49-F238E27FC236}">
+              <a16:creationId xmlns:a16="http://schemas.microsoft.com/office/drawing/2014/main" id="{26766216-8F70-A766-8B14-8B2E3F977AFC}"/>
+            </a:ext>
+          </a:extLst>
+        </p:cNvPr>
+        <p:cNvGrpSpPr/>
+        <p:nvPr/>
+      </p:nvGrpSpPr>
+      <p:grpSpPr>
+        <a:xfrm>
+          <a:off x="0" y="0"/>
+          <a:ext cx="0" cy="0"/>
+          <a:chOff x="0" y="0"/>
+          <a:chExt cx="0" cy="0"/>
+        </a:xfrm>
+      </p:grpSpPr>
+      <p:sp>
+        <p:nvSpPr>
+          <p:cNvPr id="2" name="Title 1">
+            <a:extLst>
+              <a:ext uri="{FF2B5EF4-FFF2-40B4-BE49-F238E27FC236}">
+                <a16:creationId xmlns:a16="http://schemas.microsoft.com/office/drawing/2014/main" id="{238D601F-BA53-7E63-6735-86340D94BB04}"/>
+              </a:ext>
+            </a:extLst>
+          </p:cNvPr>
+          <p:cNvSpPr>
+            <a:spLocks noGrp="1"/>
+          </p:cNvSpPr>
+          <p:nvPr>
+            <p:ph type="title"/>
+          </p:nvPr>
+        </p:nvSpPr>
+        <p:spPr>
+          <a:xfrm>
+            <a:off x="594360" y="278129"/>
+            <a:ext cx="9778365" cy="1494596"/>
+          </a:xfrm>
+        </p:spPr>
+        <p:txBody>
+          <a:bodyPr/>
+          <a:lstStyle/>
+          <a:p>
+            <a:r>
+              <a:rPr lang="en-US" dirty="0">
+                <a:latin typeface="Times New Roman" panose="02020603050405020304" pitchFamily="18" charset="0"/>
+                <a:cs typeface="Times New Roman" panose="02020603050405020304" pitchFamily="18" charset="0"/>
+              </a:rPr>
+              <a:t>Literature Survey</a:t>
+            </a:r>
+          </a:p>
+        </p:txBody>
+      </p:sp>
+      <p:graphicFrame>
+        <p:nvGraphicFramePr>
+          <p:cNvPr id="3" name="Table 2">
+            <a:extLst>
+              <a:ext uri="{FF2B5EF4-FFF2-40B4-BE49-F238E27FC236}">
+                <a16:creationId xmlns:a16="http://schemas.microsoft.com/office/drawing/2014/main" id="{F5F67D7E-5248-5D5A-C224-8655B14B4403}"/>
+              </a:ext>
+            </a:extLst>
+          </p:cNvPr>
+          <p:cNvGraphicFramePr>
+            <a:graphicFrameLocks noGrp="1"/>
+          </p:cNvGraphicFramePr>
+          <p:nvPr>
+            <p:extLst>
+              <p:ext uri="{D42A27DB-BD31-4B8C-83A1-F6EECF244321}">
+                <p14:modId xmlns:p14="http://schemas.microsoft.com/office/powerpoint/2010/main" val="839012004"/>
+              </p:ext>
+            </p:extLst>
+          </p:nvPr>
+        </p:nvGraphicFramePr>
+        <p:xfrm>
+          <a:off x="593726" y="2675414"/>
+          <a:ext cx="10382248" cy="2895600"/>
+        </p:xfrm>
+        <a:graphic>
+          <a:graphicData uri="http://schemas.openxmlformats.org/drawingml/2006/table">
+            <a:tbl>
+              <a:tblPr/>
+              <a:tblGrid>
+                <a:gridCol w="2595562">
+                  <a:extLst>
+                    <a:ext uri="{9D8B030D-6E8A-4147-A177-3AD203B41FA5}">
+                      <a16:colId xmlns:a16="http://schemas.microsoft.com/office/drawing/2014/main" val="1779912391"/>
+                    </a:ext>
+                  </a:extLst>
+                </a:gridCol>
+                <a:gridCol w="2595562">
+                  <a:extLst>
+                    <a:ext uri="{9D8B030D-6E8A-4147-A177-3AD203B41FA5}">
+                      <a16:colId xmlns:a16="http://schemas.microsoft.com/office/drawing/2014/main" val="326444719"/>
+                    </a:ext>
+                  </a:extLst>
+                </a:gridCol>
+                <a:gridCol w="2595562">
+                  <a:extLst>
+                    <a:ext uri="{9D8B030D-6E8A-4147-A177-3AD203B41FA5}">
+                      <a16:colId xmlns:a16="http://schemas.microsoft.com/office/drawing/2014/main" val="2733417503"/>
+                    </a:ext>
+                  </a:extLst>
+                </a:gridCol>
+                <a:gridCol w="2595562">
+                  <a:extLst>
+                    <a:ext uri="{9D8B030D-6E8A-4147-A177-3AD203B41FA5}">
+                      <a16:colId xmlns:a16="http://schemas.microsoft.com/office/drawing/2014/main" val="3372057975"/>
+                    </a:ext>
+                  </a:extLst>
+                </a:gridCol>
+              </a:tblGrid>
+              <a:tr h="365760">
+                <a:tc>
+                  <a:txBody>
+                    <a:bodyPr/>
+                    <a:lstStyle/>
+                    <a:p>
+                      <a:pPr>
+                        <a:buNone/>
+                      </a:pPr>
+                      <a:r>
+                        <a:rPr lang="en-IN" sz="2000">
+                          <a:solidFill>
+                            <a:schemeClr val="bg1"/>
+                          </a:solidFill>
+                          <a:latin typeface="Times New Roman" panose="02020603050405020304" pitchFamily="18" charset="0"/>
+                          <a:cs typeface="Times New Roman" panose="02020603050405020304" pitchFamily="18" charset="0"/>
+                        </a:rPr>
+                        <a:t>Author / Year</a:t>
+                      </a:r>
+                    </a:p>
+                  </a:txBody>
+                  <a:tcPr anchor="ctr">
+                    <a:lnL>
+                      <a:noFill/>
+                    </a:lnL>
+                    <a:lnR>
+                      <a:noFill/>
+                    </a:lnR>
+                    <a:lnT>
+                      <a:noFill/>
+                    </a:lnT>
+                    <a:lnB>
+                      <a:noFill/>
+                    </a:lnB>
+                    <a:noFill/>
+                  </a:tcPr>
+                </a:tc>
+                <a:tc>
+                  <a:txBody>
+                    <a:bodyPr/>
+                    <a:lstStyle/>
+                    <a:p>
+                      <a:pPr>
+                        <a:buNone/>
+                      </a:pPr>
+                      <a:r>
+                        <a:rPr lang="en-IN" sz="2000">
+                          <a:solidFill>
+                            <a:schemeClr val="bg1"/>
+                          </a:solidFill>
+                          <a:latin typeface="Times New Roman" panose="02020603050405020304" pitchFamily="18" charset="0"/>
+                          <a:cs typeface="Times New Roman" panose="02020603050405020304" pitchFamily="18" charset="0"/>
+                        </a:rPr>
+                        <a:t>Title / System</a:t>
+                      </a:r>
+                    </a:p>
+                  </a:txBody>
+                  <a:tcPr anchor="ctr">
+                    <a:lnL>
+                      <a:noFill/>
+                    </a:lnL>
+                    <a:lnR>
+                      <a:noFill/>
+                    </a:lnR>
+                    <a:lnT>
+                      <a:noFill/>
+                    </a:lnT>
+                    <a:lnB>
+                      <a:noFill/>
+                    </a:lnB>
+                    <a:noFill/>
+                  </a:tcPr>
+                </a:tc>
+                <a:tc>
+                  <a:txBody>
+                    <a:bodyPr/>
+                    <a:lstStyle/>
+                    <a:p>
+                      <a:pPr>
+                        <a:buNone/>
+                      </a:pPr>
+                      <a:r>
+                        <a:rPr lang="en-IN" sz="2000">
+                          <a:solidFill>
+                            <a:schemeClr val="bg1"/>
+                          </a:solidFill>
+                          <a:latin typeface="Times New Roman" panose="02020603050405020304" pitchFamily="18" charset="0"/>
+                          <a:cs typeface="Times New Roman" panose="02020603050405020304" pitchFamily="18" charset="0"/>
+                        </a:rPr>
+                        <a:t>Key Contributions</a:t>
+                      </a:r>
+                    </a:p>
+                  </a:txBody>
+                  <a:tcPr anchor="ctr">
+                    <a:lnL>
+                      <a:noFill/>
+                    </a:lnL>
+                    <a:lnR>
+                      <a:noFill/>
+                    </a:lnR>
+                    <a:lnT>
+                      <a:noFill/>
+                    </a:lnT>
+                    <a:lnB>
+                      <a:noFill/>
+                    </a:lnB>
+                    <a:noFill/>
+                  </a:tcPr>
+                </a:tc>
+                <a:tc>
+                  <a:txBody>
+                    <a:bodyPr/>
+                    <a:lstStyle/>
+                    <a:p>
+                      <a:pPr>
+                        <a:buNone/>
+                      </a:pPr>
+                      <a:r>
+                        <a:rPr lang="en-IN" sz="2000">
+                          <a:solidFill>
+                            <a:schemeClr val="bg1"/>
+                          </a:solidFill>
+                          <a:latin typeface="Times New Roman" panose="02020603050405020304" pitchFamily="18" charset="0"/>
+                          <a:cs typeface="Times New Roman" panose="02020603050405020304" pitchFamily="18" charset="0"/>
+                        </a:rPr>
+                        <a:t>Limitations</a:t>
+                      </a:r>
+                    </a:p>
+                  </a:txBody>
+                  <a:tcPr anchor="ctr">
+                    <a:lnL>
+                      <a:noFill/>
+                    </a:lnL>
+                    <a:lnR>
+                      <a:noFill/>
+                    </a:lnR>
+                    <a:lnT>
+                      <a:noFill/>
+                    </a:lnT>
+                    <a:lnB>
+                      <a:noFill/>
+                    </a:lnB>
+                    <a:noFill/>
+                  </a:tcPr>
+                </a:tc>
+                <a:extLst>
+                  <a:ext uri="{0D108BD9-81ED-4DB2-BD59-A6C34878D82A}">
+                    <a16:rowId xmlns:a16="http://schemas.microsoft.com/office/drawing/2014/main" val="1660874605"/>
+                  </a:ext>
+                </a:extLst>
+              </a:tr>
+              <a:tr h="640080">
+                <a:tc>
+                  <a:txBody>
+                    <a:bodyPr/>
+                    <a:lstStyle/>
+                    <a:p>
+                      <a:pPr>
+                        <a:buNone/>
+                      </a:pPr>
+                      <a:r>
+                        <a:rPr lang="en-IN" sz="2000" dirty="0">
+                          <a:solidFill>
+                            <a:schemeClr val="bg1"/>
+                          </a:solidFill>
+                          <a:latin typeface="Times New Roman" panose="02020603050405020304" pitchFamily="18" charset="0"/>
+                          <a:cs typeface="Times New Roman" panose="02020603050405020304" pitchFamily="18" charset="0"/>
+                        </a:rPr>
+                        <a:t>Ahmed et al., 2023</a:t>
+                      </a:r>
+                    </a:p>
+                  </a:txBody>
+                  <a:tcPr anchor="ctr">
+                    <a:lnL>
+                      <a:noFill/>
+                    </a:lnL>
+                    <a:lnR>
+                      <a:noFill/>
+                    </a:lnR>
+                    <a:lnT>
+                      <a:noFill/>
+                    </a:lnT>
+                    <a:lnB>
+                      <a:noFill/>
+                    </a:lnB>
+                    <a:noFill/>
+                  </a:tcPr>
+                </a:tc>
+                <a:tc>
+                  <a:txBody>
+                    <a:bodyPr/>
+                    <a:lstStyle/>
+                    <a:p>
+                      <a:pPr>
+                        <a:buNone/>
+                      </a:pPr>
+                      <a:r>
+                        <a:rPr lang="en-IN" sz="2000" dirty="0">
+                          <a:solidFill>
+                            <a:schemeClr val="bg1"/>
+                          </a:solidFill>
+                          <a:latin typeface="Times New Roman" panose="02020603050405020304" pitchFamily="18" charset="0"/>
+                          <a:cs typeface="Times New Roman" panose="02020603050405020304" pitchFamily="18" charset="0"/>
+                        </a:rPr>
+                        <a:t>Secure Online Exam System</a:t>
+                      </a:r>
+                    </a:p>
+                  </a:txBody>
+                  <a:tcPr anchor="ctr">
+                    <a:lnL>
+                      <a:noFill/>
+                    </a:lnL>
+                    <a:lnR>
+                      <a:noFill/>
+                    </a:lnR>
+                    <a:lnT>
+                      <a:noFill/>
+                    </a:lnT>
+                    <a:lnB>
+                      <a:noFill/>
+                    </a:lnB>
+                    <a:noFill/>
+                  </a:tcPr>
+                </a:tc>
+                <a:tc>
+                  <a:txBody>
+                    <a:bodyPr/>
+                    <a:lstStyle/>
+                    <a:p>
+                      <a:pPr>
+                        <a:buNone/>
+                      </a:pPr>
+                      <a:r>
+                        <a:rPr lang="en-IN" sz="2000">
+                          <a:solidFill>
+                            <a:schemeClr val="bg1"/>
+                          </a:solidFill>
+                          <a:latin typeface="Times New Roman" panose="02020603050405020304" pitchFamily="18" charset="0"/>
+                          <a:cs typeface="Times New Roman" panose="02020603050405020304" pitchFamily="18" charset="0"/>
+                        </a:rPr>
+                        <a:t>Encryption, secure login</a:t>
+                      </a:r>
+                    </a:p>
+                  </a:txBody>
+                  <a:tcPr anchor="ctr">
+                    <a:lnL>
+                      <a:noFill/>
+                    </a:lnL>
+                    <a:lnR>
+                      <a:noFill/>
+                    </a:lnR>
+                    <a:lnT>
+                      <a:noFill/>
+                    </a:lnT>
+                    <a:lnB>
+                      <a:noFill/>
+                    </a:lnB>
+                    <a:noFill/>
+                  </a:tcPr>
+                </a:tc>
+                <a:tc>
+                  <a:txBody>
+                    <a:bodyPr/>
+                    <a:lstStyle/>
+                    <a:p>
+                      <a:pPr>
+                        <a:buNone/>
+                      </a:pPr>
+                      <a:r>
+                        <a:rPr lang="en-IN" sz="2000">
+                          <a:solidFill>
+                            <a:schemeClr val="bg1"/>
+                          </a:solidFill>
+                          <a:latin typeface="Times New Roman" panose="02020603050405020304" pitchFamily="18" charset="0"/>
+                          <a:cs typeface="Times New Roman" panose="02020603050405020304" pitchFamily="18" charset="0"/>
+                        </a:rPr>
+                        <a:t>No real-time monitoring</a:t>
+                      </a:r>
+                    </a:p>
+                  </a:txBody>
+                  <a:tcPr anchor="ctr">
+                    <a:lnL>
+                      <a:noFill/>
+                    </a:lnL>
+                    <a:lnR>
+                      <a:noFill/>
+                    </a:lnR>
+                    <a:lnT>
+                      <a:noFill/>
+                    </a:lnT>
+                    <a:lnB>
+                      <a:noFill/>
+                    </a:lnB>
+                    <a:noFill/>
+                  </a:tcPr>
+                </a:tc>
+                <a:extLst>
+                  <a:ext uri="{0D108BD9-81ED-4DB2-BD59-A6C34878D82A}">
+                    <a16:rowId xmlns:a16="http://schemas.microsoft.com/office/drawing/2014/main" val="795636392"/>
+                  </a:ext>
+                </a:extLst>
+              </a:tr>
+              <a:tr h="365760">
+                <a:tc>
+                  <a:txBody>
+                    <a:bodyPr/>
+                    <a:lstStyle/>
+                    <a:p>
+                      <a:pPr>
+                        <a:buNone/>
+                      </a:pPr>
+                      <a:r>
+                        <a:rPr lang="en-IN" sz="2000">
+                          <a:solidFill>
+                            <a:schemeClr val="bg1"/>
+                          </a:solidFill>
+                          <a:latin typeface="Times New Roman" panose="02020603050405020304" pitchFamily="18" charset="0"/>
+                          <a:cs typeface="Times New Roman" panose="02020603050405020304" pitchFamily="18" charset="0"/>
+                        </a:rPr>
+                        <a:t>Rao &amp; Mehta, 2023</a:t>
+                      </a:r>
+                    </a:p>
+                  </a:txBody>
+                  <a:tcPr anchor="ctr">
+                    <a:lnL>
+                      <a:noFill/>
+                    </a:lnL>
+                    <a:lnR>
+                      <a:noFill/>
+                    </a:lnR>
+                    <a:lnT>
+                      <a:noFill/>
+                    </a:lnT>
+                    <a:lnB>
+                      <a:noFill/>
+                    </a:lnB>
+                    <a:noFill/>
+                  </a:tcPr>
+                </a:tc>
+                <a:tc>
+                  <a:txBody>
+                    <a:bodyPr/>
+                    <a:lstStyle/>
+                    <a:p>
+                      <a:pPr>
+                        <a:buNone/>
+                      </a:pPr>
+                      <a:r>
+                        <a:rPr lang="en-IN" sz="2000">
+                          <a:solidFill>
+                            <a:schemeClr val="bg1"/>
+                          </a:solidFill>
+                          <a:latin typeface="Times New Roman" panose="02020603050405020304" pitchFamily="18" charset="0"/>
+                          <a:cs typeface="Times New Roman" panose="02020603050405020304" pitchFamily="18" charset="0"/>
+                        </a:rPr>
+                        <a:t>E-Assessment Platform</a:t>
+                      </a:r>
+                    </a:p>
+                  </a:txBody>
+                  <a:tcPr anchor="ctr">
+                    <a:lnL>
+                      <a:noFill/>
+                    </a:lnL>
+                    <a:lnR>
+                      <a:noFill/>
+                    </a:lnR>
+                    <a:lnT>
+                      <a:noFill/>
+                    </a:lnT>
+                    <a:lnB>
+                      <a:noFill/>
+                    </a:lnB>
+                    <a:noFill/>
+                  </a:tcPr>
+                </a:tc>
+                <a:tc>
+                  <a:txBody>
+                    <a:bodyPr/>
+                    <a:lstStyle/>
+                    <a:p>
+                      <a:pPr>
+                        <a:buNone/>
+                      </a:pPr>
+                      <a:r>
+                        <a:rPr lang="en-IN" sz="2000">
+                          <a:solidFill>
+                            <a:schemeClr val="bg1"/>
+                          </a:solidFill>
+                          <a:latin typeface="Times New Roman" panose="02020603050405020304" pitchFamily="18" charset="0"/>
+                          <a:cs typeface="Times New Roman" panose="02020603050405020304" pitchFamily="18" charset="0"/>
+                        </a:rPr>
+                        <a:t>Fast result generation</a:t>
+                      </a:r>
+                    </a:p>
+                  </a:txBody>
+                  <a:tcPr anchor="ctr">
+                    <a:lnL>
+                      <a:noFill/>
+                    </a:lnL>
+                    <a:lnR>
+                      <a:noFill/>
+                    </a:lnR>
+                    <a:lnT>
+                      <a:noFill/>
+                    </a:lnT>
+                    <a:lnB>
+                      <a:noFill/>
+                    </a:lnB>
+                    <a:noFill/>
+                  </a:tcPr>
+                </a:tc>
+                <a:tc>
+                  <a:txBody>
+                    <a:bodyPr/>
+                    <a:lstStyle/>
+                    <a:p>
+                      <a:pPr>
+                        <a:buNone/>
+                      </a:pPr>
+                      <a:r>
+                        <a:rPr lang="en-IN" sz="2000">
+                          <a:solidFill>
+                            <a:schemeClr val="bg1"/>
+                          </a:solidFill>
+                          <a:latin typeface="Times New Roman" panose="02020603050405020304" pitchFamily="18" charset="0"/>
+                          <a:cs typeface="Times New Roman" panose="02020603050405020304" pitchFamily="18" charset="0"/>
+                        </a:rPr>
+                        <a:t>MCQ-only support</a:t>
+                      </a:r>
+                    </a:p>
+                  </a:txBody>
+                  <a:tcPr anchor="ctr">
+                    <a:lnL>
+                      <a:noFill/>
+                    </a:lnL>
+                    <a:lnR>
+                      <a:noFill/>
+                    </a:lnR>
+                    <a:lnT>
+                      <a:noFill/>
+                    </a:lnT>
+                    <a:lnB>
+                      <a:noFill/>
+                    </a:lnB>
+                    <a:noFill/>
+                  </a:tcPr>
+                </a:tc>
+                <a:extLst>
+                  <a:ext uri="{0D108BD9-81ED-4DB2-BD59-A6C34878D82A}">
+                    <a16:rowId xmlns:a16="http://schemas.microsoft.com/office/drawing/2014/main" val="2848066123"/>
+                  </a:ext>
+                </a:extLst>
+              </a:tr>
+              <a:tr h="640080">
+                <a:tc>
+                  <a:txBody>
+                    <a:bodyPr/>
+                    <a:lstStyle/>
+                    <a:p>
+                      <a:pPr>
+                        <a:buNone/>
+                      </a:pPr>
+                      <a:r>
+                        <a:rPr lang="en-IN" sz="2000">
+                          <a:solidFill>
+                            <a:schemeClr val="bg1"/>
+                          </a:solidFill>
+                          <a:latin typeface="Times New Roman" panose="02020603050405020304" pitchFamily="18" charset="0"/>
+                          <a:cs typeface="Times New Roman" panose="02020603050405020304" pitchFamily="18" charset="0"/>
+                        </a:rPr>
+                        <a:t>Zhang et al., 2024</a:t>
+                      </a:r>
+                    </a:p>
+                  </a:txBody>
+                  <a:tcPr anchor="ctr">
+                    <a:lnL>
+                      <a:noFill/>
+                    </a:lnL>
+                    <a:lnR>
+                      <a:noFill/>
+                    </a:lnR>
+                    <a:lnT>
+                      <a:noFill/>
+                    </a:lnT>
+                    <a:lnB>
+                      <a:noFill/>
+                    </a:lnB>
+                    <a:noFill/>
+                  </a:tcPr>
+                </a:tc>
+                <a:tc>
+                  <a:txBody>
+                    <a:bodyPr/>
+                    <a:lstStyle/>
+                    <a:p>
+                      <a:pPr>
+                        <a:buNone/>
+                      </a:pPr>
+                      <a:r>
+                        <a:rPr lang="en-IN" sz="2000">
+                          <a:solidFill>
+                            <a:schemeClr val="bg1"/>
+                          </a:solidFill>
+                          <a:latin typeface="Times New Roman" panose="02020603050405020304" pitchFamily="18" charset="0"/>
+                          <a:cs typeface="Times New Roman" panose="02020603050405020304" pitchFamily="18" charset="0"/>
+                        </a:rPr>
+                        <a:t>AI-Enabled Assessment System</a:t>
+                      </a:r>
+                    </a:p>
+                  </a:txBody>
+                  <a:tcPr anchor="ctr">
+                    <a:lnL>
+                      <a:noFill/>
+                    </a:lnL>
+                    <a:lnR>
+                      <a:noFill/>
+                    </a:lnR>
+                    <a:lnT>
+                      <a:noFill/>
+                    </a:lnT>
+                    <a:lnB>
+                      <a:noFill/>
+                    </a:lnB>
+                    <a:noFill/>
+                  </a:tcPr>
+                </a:tc>
+                <a:tc>
+                  <a:txBody>
+                    <a:bodyPr/>
+                    <a:lstStyle/>
+                    <a:p>
+                      <a:pPr>
+                        <a:buNone/>
+                      </a:pPr>
+                      <a:r>
+                        <a:rPr lang="en-IN" sz="2000">
+                          <a:solidFill>
+                            <a:schemeClr val="bg1"/>
+                          </a:solidFill>
+                          <a:latin typeface="Times New Roman" panose="02020603050405020304" pitchFamily="18" charset="0"/>
+                          <a:cs typeface="Times New Roman" panose="02020603050405020304" pitchFamily="18" charset="0"/>
+                        </a:rPr>
+                        <a:t>Adaptive testing, analytics</a:t>
+                      </a:r>
+                    </a:p>
+                  </a:txBody>
+                  <a:tcPr anchor="ctr">
+                    <a:lnL>
+                      <a:noFill/>
+                    </a:lnL>
+                    <a:lnR>
+                      <a:noFill/>
+                    </a:lnR>
+                    <a:lnT>
+                      <a:noFill/>
+                    </a:lnT>
+                    <a:lnB>
+                      <a:noFill/>
+                    </a:lnB>
+                    <a:noFill/>
+                  </a:tcPr>
+                </a:tc>
+                <a:tc>
+                  <a:txBody>
+                    <a:bodyPr/>
+                    <a:lstStyle/>
+                    <a:p>
+                      <a:pPr>
+                        <a:buNone/>
+                      </a:pPr>
+                      <a:r>
+                        <a:rPr lang="en-IN" sz="2000">
+                          <a:solidFill>
+                            <a:schemeClr val="bg1"/>
+                          </a:solidFill>
+                          <a:latin typeface="Times New Roman" panose="02020603050405020304" pitchFamily="18" charset="0"/>
+                          <a:cs typeface="Times New Roman" panose="02020603050405020304" pitchFamily="18" charset="0"/>
+                        </a:rPr>
+                        <a:t>Complex implementation</a:t>
+                      </a:r>
+                    </a:p>
+                  </a:txBody>
+                  <a:tcPr anchor="ctr">
+                    <a:lnL>
+                      <a:noFill/>
+                    </a:lnL>
+                    <a:lnR>
+                      <a:noFill/>
+                    </a:lnR>
+                    <a:lnT>
+                      <a:noFill/>
+                    </a:lnT>
+                    <a:lnB>
+                      <a:noFill/>
+                    </a:lnB>
+                    <a:noFill/>
+                  </a:tcPr>
+                </a:tc>
+                <a:extLst>
+                  <a:ext uri="{0D108BD9-81ED-4DB2-BD59-A6C34878D82A}">
+                    <a16:rowId xmlns:a16="http://schemas.microsoft.com/office/drawing/2014/main" val="956356952"/>
+                  </a:ext>
+                </a:extLst>
+              </a:tr>
+              <a:tr h="640080">
+                <a:tc>
+                  <a:txBody>
+                    <a:bodyPr/>
+                    <a:lstStyle/>
+                    <a:p>
+                      <a:pPr>
+                        <a:buNone/>
+                      </a:pPr>
+                      <a:r>
+                        <a:rPr lang="en-IN" sz="2000">
+                          <a:solidFill>
+                            <a:schemeClr val="bg1"/>
+                          </a:solidFill>
+                          <a:latin typeface="Times New Roman" panose="02020603050405020304" pitchFamily="18" charset="0"/>
+                          <a:cs typeface="Times New Roman" panose="02020603050405020304" pitchFamily="18" charset="0"/>
+                        </a:rPr>
+                        <a:t>Wilson et al., 2024</a:t>
+                      </a:r>
+                    </a:p>
+                  </a:txBody>
+                  <a:tcPr anchor="ctr">
+                    <a:lnL>
+                      <a:noFill/>
+                    </a:lnL>
+                    <a:lnR>
+                      <a:noFill/>
+                    </a:lnR>
+                    <a:lnT>
+                      <a:noFill/>
+                    </a:lnT>
+                    <a:lnB>
+                      <a:noFill/>
+                    </a:lnB>
+                    <a:noFill/>
+                  </a:tcPr>
+                </a:tc>
+                <a:tc>
+                  <a:txBody>
+                    <a:bodyPr/>
+                    <a:lstStyle/>
+                    <a:p>
+                      <a:pPr>
+                        <a:buNone/>
+                      </a:pPr>
+                      <a:r>
+                        <a:rPr lang="en-IN" sz="2000">
+                          <a:solidFill>
+                            <a:schemeClr val="bg1"/>
+                          </a:solidFill>
+                          <a:latin typeface="Times New Roman" panose="02020603050405020304" pitchFamily="18" charset="0"/>
+                          <a:cs typeface="Times New Roman" panose="02020603050405020304" pitchFamily="18" charset="0"/>
+                        </a:rPr>
+                        <a:t>Scalable Web Exam Platform</a:t>
+                      </a:r>
+                    </a:p>
+                  </a:txBody>
+                  <a:tcPr anchor="ctr">
+                    <a:lnL>
+                      <a:noFill/>
+                    </a:lnL>
+                    <a:lnR>
+                      <a:noFill/>
+                    </a:lnR>
+                    <a:lnT>
+                      <a:noFill/>
+                    </a:lnT>
+                    <a:lnB>
+                      <a:noFill/>
+                    </a:lnB>
+                    <a:noFill/>
+                  </a:tcPr>
+                </a:tc>
+                <a:tc>
+                  <a:txBody>
+                    <a:bodyPr/>
+                    <a:lstStyle/>
+                    <a:p>
+                      <a:pPr>
+                        <a:buNone/>
+                      </a:pPr>
+                      <a:r>
+                        <a:rPr lang="en-IN" sz="2000">
+                          <a:solidFill>
+                            <a:schemeClr val="bg1"/>
+                          </a:solidFill>
+                          <a:latin typeface="Times New Roman" panose="02020603050405020304" pitchFamily="18" charset="0"/>
+                          <a:cs typeface="Times New Roman" panose="02020603050405020304" pitchFamily="18" charset="0"/>
+                        </a:rPr>
+                        <a:t>High concurrency handling</a:t>
+                      </a:r>
+                    </a:p>
+                  </a:txBody>
+                  <a:tcPr anchor="ctr">
+                    <a:lnL>
+                      <a:noFill/>
+                    </a:lnL>
+                    <a:lnR>
+                      <a:noFill/>
+                    </a:lnR>
+                    <a:lnT>
+                      <a:noFill/>
+                    </a:lnT>
+                    <a:lnB>
+                      <a:noFill/>
+                    </a:lnB>
+                    <a:noFill/>
+                  </a:tcPr>
+                </a:tc>
+                <a:tc>
+                  <a:txBody>
+                    <a:bodyPr/>
+                    <a:lstStyle/>
+                    <a:p>
+                      <a:pPr>
+                        <a:buNone/>
+                      </a:pPr>
+                      <a:r>
+                        <a:rPr lang="en-IN" sz="2000" dirty="0">
+                          <a:solidFill>
+                            <a:schemeClr val="bg1"/>
+                          </a:solidFill>
+                          <a:latin typeface="Times New Roman" panose="02020603050405020304" pitchFamily="18" charset="0"/>
+                          <a:cs typeface="Times New Roman" panose="02020603050405020304" pitchFamily="18" charset="0"/>
+                        </a:rPr>
+                        <a:t>No integrated coding tests</a:t>
+                      </a:r>
+                    </a:p>
+                  </a:txBody>
+                  <a:tcPr anchor="ctr">
+                    <a:lnL>
+                      <a:noFill/>
+                    </a:lnL>
+                    <a:lnR>
+                      <a:noFill/>
+                    </a:lnR>
+                    <a:lnT>
+                      <a:noFill/>
+                    </a:lnT>
+                    <a:lnB>
+                      <a:noFill/>
+                    </a:lnB>
+                    <a:noFill/>
+                  </a:tcPr>
+                </a:tc>
+                <a:extLst>
+                  <a:ext uri="{0D108BD9-81ED-4DB2-BD59-A6C34878D82A}">
+                    <a16:rowId xmlns:a16="http://schemas.microsoft.com/office/drawing/2014/main" val="3894014427"/>
+                  </a:ext>
+                </a:extLst>
+              </a:tr>
+            </a:tbl>
+          </a:graphicData>
+        </a:graphic>
+      </p:graphicFrame>
+    </p:spTree>
+    <p:extLst>
+      <p:ext uri="{BB962C8B-B14F-4D97-AF65-F5344CB8AC3E}">
+        <p14:creationId xmlns:p14="http://schemas.microsoft.com/office/powerpoint/2010/main" val="774991447"/>
+      </p:ext>
+    </p:extLst>
+  </p:cSld>
+  <p:clrMapOvr>
+    <a:masterClrMapping/>
+  </p:clrMapOvr>
+</p:sld>
+</file>
+
+<file path=ppt/slides/slide8.xml><?xml version="1.0" encoding="utf-8"?>
 <p:sld xmlns:a="http://schemas.openxmlformats.org/drawingml/2006/main" xmlns:r="http://schemas.openxmlformats.org/officeDocument/2006/relationships" xmlns:p="http://schemas.openxmlformats.org/presentationml/2006/main">
   <p:cSld>
     <p:spTree>
@@ -12917,155 +14628,64 @@
         </p:spPr>
         <p:txBody>
           <a:bodyPr>
-            <a:normAutofit/>
+            <a:normAutofit fontScale="85000" lnSpcReduction="20000"/>
           </a:bodyPr>
           <a:lstStyle/>
           <a:p>
             <a:r>
-              <a:rPr lang="en-US" b="1" dirty="0">
-                <a:latin typeface="Times New Roman" panose="02020603050405020304" pitchFamily="18" charset="0"/>
-                <a:cs typeface="Times New Roman" panose="02020603050405020304" pitchFamily="18" charset="0"/>
-              </a:rPr>
-              <a:t>Project Planning : </a:t>
-            </a:r>
-          </a:p>
-          <a:p>
-            <a:r>
-              <a:rPr lang="en-US" dirty="0">
-                <a:latin typeface="Times New Roman" panose="02020603050405020304" pitchFamily="18" charset="0"/>
-                <a:cs typeface="Times New Roman" panose="02020603050405020304" pitchFamily="18" charset="0"/>
-              </a:rPr>
-              <a:t>Requirement analysis</a:t>
-            </a:r>
-          </a:p>
-          <a:p>
-            <a:pPr>
-              <a:spcBef>
-                <a:spcPts val="0"/>
-              </a:spcBef>
-            </a:pPr>
-            <a:r>
-              <a:rPr lang="en-US" dirty="0">
-                <a:latin typeface="Times New Roman" panose="02020603050405020304" pitchFamily="18" charset="0"/>
-                <a:cs typeface="Times New Roman" panose="02020603050405020304" pitchFamily="18" charset="0"/>
-              </a:rPr>
-              <a:t>System design</a:t>
-            </a:r>
-          </a:p>
-          <a:p>
-            <a:pPr>
-              <a:spcBef>
-                <a:spcPts val="0"/>
-              </a:spcBef>
-            </a:pPr>
-            <a:r>
-              <a:rPr lang="en-US" dirty="0">
-                <a:latin typeface="Times New Roman" panose="02020603050405020304" pitchFamily="18" charset="0"/>
-                <a:cs typeface="Times New Roman" panose="02020603050405020304" pitchFamily="18" charset="0"/>
-              </a:rPr>
-              <a:t>Development</a:t>
-            </a:r>
-          </a:p>
-          <a:p>
-            <a:pPr>
-              <a:spcBef>
-                <a:spcPts val="0"/>
-              </a:spcBef>
-            </a:pPr>
-            <a:r>
-              <a:rPr lang="en-US" dirty="0">
-                <a:latin typeface="Times New Roman" panose="02020603050405020304" pitchFamily="18" charset="0"/>
-                <a:cs typeface="Times New Roman" panose="02020603050405020304" pitchFamily="18" charset="0"/>
-              </a:rPr>
-              <a:t>Testing</a:t>
-            </a:r>
-          </a:p>
-          <a:p>
-            <a:pPr>
-              <a:spcBef>
-                <a:spcPts val="0"/>
-              </a:spcBef>
-            </a:pPr>
-            <a:r>
-              <a:rPr lang="en-US" dirty="0">
-                <a:latin typeface="Times New Roman" panose="02020603050405020304" pitchFamily="18" charset="0"/>
-                <a:cs typeface="Times New Roman" panose="02020603050405020304" pitchFamily="18" charset="0"/>
-              </a:rPr>
-              <a:t>Deployment</a:t>
-            </a:r>
-          </a:p>
-          <a:p>
-            <a:r>
-              <a:rPr lang="en-US" b="1" dirty="0">
-                <a:latin typeface="Times New Roman" panose="02020603050405020304" pitchFamily="18" charset="0"/>
-                <a:cs typeface="Times New Roman" panose="02020603050405020304" pitchFamily="18" charset="0"/>
-              </a:rPr>
-              <a:t>Stakeholders &amp; Roles : </a:t>
-            </a:r>
-          </a:p>
-          <a:p>
-            <a:r>
-              <a:rPr lang="en-US" b="1" dirty="0">
-                <a:latin typeface="Times New Roman" panose="02020603050405020304" pitchFamily="18" charset="0"/>
-                <a:cs typeface="Times New Roman" panose="02020603050405020304" pitchFamily="18" charset="0"/>
-              </a:rPr>
-              <a:t>Admin:</a:t>
-            </a:r>
-            <a:r>
-              <a:rPr lang="en-US" dirty="0">
-                <a:latin typeface="Times New Roman" panose="02020603050405020304" pitchFamily="18" charset="0"/>
-                <a:cs typeface="Times New Roman" panose="02020603050405020304" pitchFamily="18" charset="0"/>
-              </a:rPr>
-              <a:t> Exam and question management</a:t>
-            </a:r>
-          </a:p>
-          <a:p>
-            <a:pPr>
-              <a:spcBef>
-                <a:spcPts val="0"/>
-              </a:spcBef>
-            </a:pPr>
-            <a:r>
-              <a:rPr lang="en-US" b="1" dirty="0">
-                <a:latin typeface="Times New Roman" panose="02020603050405020304" pitchFamily="18" charset="0"/>
-                <a:cs typeface="Times New Roman" panose="02020603050405020304" pitchFamily="18" charset="0"/>
-              </a:rPr>
-              <a:t>Student:</a:t>
-            </a:r>
-            <a:r>
-              <a:rPr lang="en-US" dirty="0">
-                <a:latin typeface="Times New Roman" panose="02020603050405020304" pitchFamily="18" charset="0"/>
-                <a:cs typeface="Times New Roman" panose="02020603050405020304" pitchFamily="18" charset="0"/>
-              </a:rPr>
-              <a:t> Exam participation</a:t>
-            </a:r>
-          </a:p>
-          <a:p>
-            <a:pPr>
-              <a:spcBef>
-                <a:spcPts val="0"/>
-              </a:spcBef>
-            </a:pPr>
-            <a:r>
-              <a:rPr lang="en-US" b="1" dirty="0">
-                <a:latin typeface="Times New Roman" panose="02020603050405020304" pitchFamily="18" charset="0"/>
-                <a:cs typeface="Times New Roman" panose="02020603050405020304" pitchFamily="18" charset="0"/>
-              </a:rPr>
-              <a:t>System:</a:t>
-            </a:r>
-            <a:r>
-              <a:rPr lang="en-US" dirty="0">
-                <a:latin typeface="Times New Roman" panose="02020603050405020304" pitchFamily="18" charset="0"/>
-                <a:cs typeface="Times New Roman" panose="02020603050405020304" pitchFamily="18" charset="0"/>
-              </a:rPr>
-              <a:t> Evaluation and data storage</a:t>
-            </a:r>
-          </a:p>
-          <a:p>
-            <a:endParaRPr lang="en-US" dirty="0">
-              <a:latin typeface="Times New Roman" panose="02020603050405020304" pitchFamily="18" charset="0"/>
-              <a:cs typeface="Times New Roman" panose="02020603050405020304" pitchFamily="18" charset="0"/>
-            </a:endParaRPr>
+              <a:rPr lang="en-US" b="1" dirty="0"/>
+              <a:t>Project Planning</a:t>
+            </a:r>
+            <a:endParaRPr lang="en-US" dirty="0"/>
+          </a:p>
+          <a:p>
+            <a:r>
+              <a:rPr lang="en-US" dirty="0"/>
+              <a:t>Requirement analysis of online assessment systems</a:t>
+            </a:r>
+          </a:p>
+          <a:p>
+            <a:r>
+              <a:rPr lang="en-US" dirty="0"/>
+              <a:t>Identification of functional and non-functional requirements</a:t>
+            </a:r>
+          </a:p>
+          <a:p>
+            <a:r>
+              <a:rPr lang="en-US" dirty="0"/>
+              <a:t>Selection of MERN stack for development</a:t>
+            </a:r>
+          </a:p>
+          <a:p>
+            <a:r>
+              <a:rPr lang="en-US" dirty="0"/>
+              <a:t>Planning development, testing, and deployment phases</a:t>
+            </a:r>
+          </a:p>
+          <a:p>
+            <a:r>
+              <a:rPr lang="en-US" b="1" dirty="0"/>
+              <a:t>Methodology Adopted</a:t>
+            </a:r>
+            <a:endParaRPr lang="en-US" dirty="0"/>
+          </a:p>
+          <a:p>
+            <a:r>
+              <a:rPr lang="en-US" dirty="0"/>
+              <a:t>Iterative development approach</a:t>
+            </a:r>
+          </a:p>
+          <a:p>
+            <a:r>
+              <a:rPr lang="en-US" dirty="0"/>
+              <a:t>Modular implementation</a:t>
+            </a:r>
+          </a:p>
+          <a:p>
+            <a:r>
+              <a:rPr lang="en-US" dirty="0"/>
+              <a:t>Continuous testing and validation</a:t>
+            </a:r>
           </a:p>
         </p:txBody>
       </p:sp>
@@ -13077,7 +14697,7 @@
 </p:sld>
 </file>
 
-<file path=ppt/slides/slide8.xml><?xml version="1.0" encoding="utf-8"?>
+<file path=ppt/slides/slide9.xml><?xml version="1.0" encoding="utf-8"?>
 <p:sld xmlns:a="http://schemas.openxmlformats.org/drawingml/2006/main" xmlns:r="http://schemas.openxmlformats.org/officeDocument/2006/relationships" xmlns:p="http://schemas.openxmlformats.org/presentationml/2006/main">
   <p:cSld>
     <p:spTree>
@@ -13155,141 +14775,73 @@
         </p:spPr>
         <p:txBody>
           <a:bodyPr>
-            <a:normAutofit lnSpcReduction="10000"/>
+            <a:normAutofit fontScale="85000" lnSpcReduction="20000"/>
           </a:bodyPr>
           <a:lstStyle/>
           <a:p>
             <a:r>
-              <a:rPr lang="en-US" b="1" dirty="0">
-                <a:latin typeface="Times New Roman" panose="02020603050405020304" pitchFamily="18" charset="0"/>
-                <a:cs typeface="Times New Roman" panose="02020603050405020304" pitchFamily="18" charset="0"/>
-              </a:rPr>
+              <a:rPr lang="en-IN" b="1" dirty="0"/>
+              <a:t>Stakeholders Identification &amp; Roles</a:t>
+            </a:r>
+          </a:p>
+          <a:p>
+            <a:r>
+              <a:rPr lang="en-IN" b="1" dirty="0"/>
+              <a:t>Admin</a:t>
+            </a:r>
+            <a:r>
+              <a:rPr lang="en-IN" dirty="0"/>
+              <a:t>: Exam creation, question management, result monitoring</a:t>
+            </a:r>
+          </a:p>
+          <a:p>
+            <a:r>
+              <a:rPr lang="en-IN" b="1" dirty="0"/>
+              <a:t>Student</a:t>
+            </a:r>
+            <a:r>
+              <a:rPr lang="en-IN" dirty="0"/>
+              <a:t>: Exam participation and result viewing</a:t>
+            </a:r>
+          </a:p>
+          <a:p>
+            <a:r>
+              <a:rPr lang="en-IN" b="1" dirty="0"/>
+              <a:t>System</a:t>
+            </a:r>
+            <a:r>
+              <a:rPr lang="en-IN" dirty="0"/>
+              <a:t>: Authentication, evaluation, data storage</a:t>
+            </a:r>
+          </a:p>
+          <a:p>
+            <a:r>
+              <a:rPr lang="en-IN" b="1" dirty="0"/>
               <a:t>Data Collection</a:t>
             </a:r>
           </a:p>
           <a:p>
             <a:r>
-              <a:rPr lang="en-US" dirty="0">
-                <a:latin typeface="Times New Roman" panose="02020603050405020304" pitchFamily="18" charset="0"/>
-                <a:cs typeface="Times New Roman" panose="02020603050405020304" pitchFamily="18" charset="0"/>
-              </a:rPr>
-              <a:t>Student details</a:t>
-            </a:r>
-          </a:p>
-          <a:p>
-            <a:pPr>
-              <a:spcBef>
-                <a:spcPts val="0"/>
-              </a:spcBef>
-            </a:pPr>
-            <a:r>
-              <a:rPr lang="en-US" dirty="0">
-                <a:latin typeface="Times New Roman" panose="02020603050405020304" pitchFamily="18" charset="0"/>
-                <a:cs typeface="Times New Roman" panose="02020603050405020304" pitchFamily="18" charset="0"/>
-              </a:rPr>
-              <a:t>Exam details</a:t>
-            </a:r>
-          </a:p>
-          <a:p>
-            <a:pPr>
-              <a:spcBef>
-                <a:spcPts val="0"/>
-              </a:spcBef>
-            </a:pPr>
-            <a:r>
-              <a:rPr lang="en-US" dirty="0">
-                <a:latin typeface="Times New Roman" panose="02020603050405020304" pitchFamily="18" charset="0"/>
-                <a:cs typeface="Times New Roman" panose="02020603050405020304" pitchFamily="18" charset="0"/>
-              </a:rPr>
-              <a:t>Questions and answers</a:t>
-            </a:r>
-          </a:p>
-          <a:p>
-            <a:pPr>
-              <a:spcBef>
-                <a:spcPts val="0"/>
-              </a:spcBef>
-            </a:pPr>
-            <a:r>
-              <a:rPr lang="en-US" dirty="0">
-                <a:latin typeface="Times New Roman" panose="02020603050405020304" pitchFamily="18" charset="0"/>
-                <a:cs typeface="Times New Roman" panose="02020603050405020304" pitchFamily="18" charset="0"/>
-              </a:rPr>
-              <a:t>Submissions and results</a:t>
-            </a:r>
-          </a:p>
-          <a:p>
-            <a:r>
-              <a:rPr lang="en-US" b="1" dirty="0">
-                <a:latin typeface="Times New Roman" panose="02020603050405020304" pitchFamily="18" charset="0"/>
-                <a:cs typeface="Times New Roman" panose="02020603050405020304" pitchFamily="18" charset="0"/>
-              </a:rPr>
-              <a:t>Workflow</a:t>
-            </a:r>
-          </a:p>
-          <a:p>
-            <a:r>
-              <a:rPr lang="en-US" dirty="0">
-                <a:latin typeface="Times New Roman" panose="02020603050405020304" pitchFamily="18" charset="0"/>
-                <a:cs typeface="Times New Roman" panose="02020603050405020304" pitchFamily="18" charset="0"/>
-              </a:rPr>
-              <a:t>Admin creates exam</a:t>
-            </a:r>
-          </a:p>
-          <a:p>
-            <a:pPr>
-              <a:spcBef>
-                <a:spcPts val="0"/>
-              </a:spcBef>
-            </a:pPr>
-            <a:r>
-              <a:rPr lang="en-US" dirty="0">
-                <a:latin typeface="Times New Roman" panose="02020603050405020304" pitchFamily="18" charset="0"/>
-                <a:cs typeface="Times New Roman" panose="02020603050405020304" pitchFamily="18" charset="0"/>
-              </a:rPr>
-              <a:t>Student registers and logs in</a:t>
-            </a:r>
-          </a:p>
-          <a:p>
-            <a:pPr>
-              <a:spcBef>
-                <a:spcPts val="0"/>
-              </a:spcBef>
-            </a:pPr>
-            <a:r>
-              <a:rPr lang="en-US" dirty="0">
-                <a:latin typeface="Times New Roman" panose="02020603050405020304" pitchFamily="18" charset="0"/>
-                <a:cs typeface="Times New Roman" panose="02020603050405020304" pitchFamily="18" charset="0"/>
-              </a:rPr>
-              <a:t>Exam attempted within time</a:t>
-            </a:r>
-          </a:p>
-          <a:p>
-            <a:pPr>
-              <a:spcBef>
-                <a:spcPts val="0"/>
-              </a:spcBef>
-            </a:pPr>
-            <a:r>
-              <a:rPr lang="en-US" dirty="0">
-                <a:latin typeface="Times New Roman" panose="02020603050405020304" pitchFamily="18" charset="0"/>
-                <a:cs typeface="Times New Roman" panose="02020603050405020304" pitchFamily="18" charset="0"/>
-              </a:rPr>
-              <a:t>Automatic evaluation</a:t>
-            </a:r>
-          </a:p>
-          <a:p>
-            <a:pPr>
-              <a:spcBef>
-                <a:spcPts val="0"/>
-              </a:spcBef>
-            </a:pPr>
-            <a:r>
-              <a:rPr lang="en-US" dirty="0">
-                <a:latin typeface="Times New Roman" panose="02020603050405020304" pitchFamily="18" charset="0"/>
-                <a:cs typeface="Times New Roman" panose="02020603050405020304" pitchFamily="18" charset="0"/>
-              </a:rPr>
-              <a:t>Result generation</a:t>
+              <a:rPr lang="en-IN" dirty="0"/>
+              <a:t>Student registration details</a:t>
+            </a:r>
+          </a:p>
+          <a:p>
+            <a:r>
+              <a:rPr lang="en-IN" dirty="0"/>
+              <a:t>Exam and question data</a:t>
+            </a:r>
+          </a:p>
+          <a:p>
+            <a:r>
+              <a:rPr lang="en-IN" dirty="0"/>
+              <a:t>Student responses and results</a:t>
+            </a:r>
+          </a:p>
+          <a:p>
+            <a:r>
+              <a:rPr lang="en-IN" dirty="0"/>
+              <a:t>Stored securely in MongoDB</a:t>
             </a:r>
           </a:p>
         </p:txBody>
@@ -13298,230 +14850,6 @@
     <p:extLst>
       <p:ext uri="{BB962C8B-B14F-4D97-AF65-F5344CB8AC3E}">
         <p14:creationId xmlns:p14="http://schemas.microsoft.com/office/powerpoint/2010/main" val="2471744429"/>
-      </p:ext>
-    </p:extLst>
-  </p:cSld>
-  <p:clrMapOvr>
-    <a:masterClrMapping/>
-  </p:clrMapOvr>
-</p:sld>
-</file>
-
-<file path=ppt/slides/slide9.xml><?xml version="1.0" encoding="utf-8"?>
-<p:sld xmlns:a="http://schemas.openxmlformats.org/drawingml/2006/main" xmlns:r="http://schemas.openxmlformats.org/officeDocument/2006/relationships" xmlns:p="http://schemas.openxmlformats.org/presentationml/2006/main">
-  <p:cSld>
-    <p:spTree>
-      <p:nvGrpSpPr>
-        <p:cNvPr id="1" name="">
-          <a:extLst>
-            <a:ext uri="{FF2B5EF4-FFF2-40B4-BE49-F238E27FC236}">
-              <a16:creationId xmlns:a16="http://schemas.microsoft.com/office/drawing/2014/main" id="{4565440F-00E3-1C59-53C8-A7ED097F1489}"/>
-            </a:ext>
-          </a:extLst>
-        </p:cNvPr>
-        <p:cNvGrpSpPr/>
-        <p:nvPr/>
-      </p:nvGrpSpPr>
-      <p:grpSpPr>
-        <a:xfrm>
-          <a:off x="0" y="0"/>
-          <a:ext cx="0" cy="0"/>
-          <a:chOff x="0" y="0"/>
-          <a:chExt cx="0" cy="0"/>
-        </a:xfrm>
-      </p:grpSpPr>
-      <p:sp>
-        <p:nvSpPr>
-          <p:cNvPr id="2" name="Title 1">
-            <a:extLst>
-              <a:ext uri="{FF2B5EF4-FFF2-40B4-BE49-F238E27FC236}">
-                <a16:creationId xmlns:a16="http://schemas.microsoft.com/office/drawing/2014/main" id="{3DFA4DC6-A926-3BF4-EF82-4FB43A6B643F}"/>
-              </a:ext>
-            </a:extLst>
-          </p:cNvPr>
-          <p:cNvSpPr>
-            <a:spLocks noGrp="1"/>
-          </p:cNvSpPr>
-          <p:nvPr>
-            <p:ph type="title"/>
-          </p:nvPr>
-        </p:nvSpPr>
-        <p:spPr/>
-        <p:txBody>
-          <a:bodyPr/>
-          <a:lstStyle/>
-          <a:p>
-            <a:r>
-              <a:rPr lang="en-US" dirty="0">
-                <a:latin typeface="Times New Roman" panose="02020603050405020304" pitchFamily="18" charset="0"/>
-                <a:cs typeface="Times New Roman" panose="02020603050405020304" pitchFamily="18" charset="0"/>
-              </a:rPr>
-              <a:t>Project Methodology</a:t>
-            </a:r>
-          </a:p>
-        </p:txBody>
-      </p:sp>
-      <p:sp>
-        <p:nvSpPr>
-          <p:cNvPr id="3" name="Content Placeholder 2">
-            <a:extLst>
-              <a:ext uri="{FF2B5EF4-FFF2-40B4-BE49-F238E27FC236}">
-                <a16:creationId xmlns:a16="http://schemas.microsoft.com/office/drawing/2014/main" id="{9C279F51-CEFC-6839-04D9-32E78BD2E20A}"/>
-              </a:ext>
-            </a:extLst>
-          </p:cNvPr>
-          <p:cNvSpPr>
-            <a:spLocks noGrp="1"/>
-          </p:cNvSpPr>
-          <p:nvPr>
-            <p:ph sz="quarter" idx="15"/>
-          </p:nvPr>
-        </p:nvSpPr>
-        <p:spPr>
-          <a:xfrm>
-            <a:off x="580504" y="2496416"/>
-            <a:ext cx="10752513" cy="3558020"/>
-          </a:xfrm>
-        </p:spPr>
-        <p:txBody>
-          <a:bodyPr>
-            <a:normAutofit/>
-          </a:bodyPr>
-          <a:lstStyle/>
-          <a:p>
-            <a:r>
-              <a:rPr lang="en-IN" b="1" dirty="0">
-                <a:latin typeface="Times New Roman" panose="02020603050405020304" pitchFamily="18" charset="0"/>
-                <a:cs typeface="Times New Roman" panose="02020603050405020304" pitchFamily="18" charset="0"/>
-              </a:rPr>
-              <a:t>Hardware Requirements</a:t>
-            </a:r>
-          </a:p>
-          <a:p>
-            <a:endParaRPr lang="en-IN" sz="100" b="1" dirty="0">
-              <a:latin typeface="Times New Roman" panose="02020603050405020304" pitchFamily="18" charset="0"/>
-              <a:cs typeface="Times New Roman" panose="02020603050405020304" pitchFamily="18" charset="0"/>
-            </a:endParaRPr>
-          </a:p>
-          <a:p>
-            <a:pPr>
-              <a:spcBef>
-                <a:spcPts val="0"/>
-              </a:spcBef>
-            </a:pPr>
-            <a:r>
-              <a:rPr lang="en-IN" dirty="0">
-                <a:latin typeface="Times New Roman" panose="02020603050405020304" pitchFamily="18" charset="0"/>
-                <a:cs typeface="Times New Roman" panose="02020603050405020304" pitchFamily="18" charset="0"/>
-              </a:rPr>
-              <a:t>Processor: Intel i3 or higher</a:t>
-            </a:r>
-          </a:p>
-          <a:p>
-            <a:pPr>
-              <a:spcBef>
-                <a:spcPts val="0"/>
-              </a:spcBef>
-            </a:pPr>
-            <a:r>
-              <a:rPr lang="en-IN" dirty="0">
-                <a:latin typeface="Times New Roman" panose="02020603050405020304" pitchFamily="18" charset="0"/>
-                <a:cs typeface="Times New Roman" panose="02020603050405020304" pitchFamily="18" charset="0"/>
-              </a:rPr>
-              <a:t>RAM: Minimum 8 GB</a:t>
-            </a:r>
-          </a:p>
-          <a:p>
-            <a:pPr>
-              <a:spcBef>
-                <a:spcPts val="0"/>
-              </a:spcBef>
-            </a:pPr>
-            <a:r>
-              <a:rPr lang="en-IN" dirty="0">
-                <a:latin typeface="Times New Roman" panose="02020603050405020304" pitchFamily="18" charset="0"/>
-                <a:cs typeface="Times New Roman" panose="02020603050405020304" pitchFamily="18" charset="0"/>
-              </a:rPr>
-              <a:t>Storage: 100 GB</a:t>
-            </a:r>
-          </a:p>
-          <a:p>
-            <a:r>
-              <a:rPr lang="en-IN" b="1" dirty="0">
-                <a:latin typeface="Times New Roman" panose="02020603050405020304" pitchFamily="18" charset="0"/>
-                <a:cs typeface="Times New Roman" panose="02020603050405020304" pitchFamily="18" charset="0"/>
-              </a:rPr>
-              <a:t>Software Requirements</a:t>
-            </a:r>
-          </a:p>
-          <a:p>
-            <a:endParaRPr lang="en-IN" sz="100" b="1" dirty="0">
-              <a:latin typeface="Times New Roman" panose="02020603050405020304" pitchFamily="18" charset="0"/>
-              <a:cs typeface="Times New Roman" panose="02020603050405020304" pitchFamily="18" charset="0"/>
-            </a:endParaRPr>
-          </a:p>
-          <a:p>
-            <a:pPr>
-              <a:spcBef>
-                <a:spcPts val="0"/>
-              </a:spcBef>
-            </a:pPr>
-            <a:r>
-              <a:rPr lang="en-IN" dirty="0">
-                <a:latin typeface="Times New Roman" panose="02020603050405020304" pitchFamily="18" charset="0"/>
-                <a:cs typeface="Times New Roman" panose="02020603050405020304" pitchFamily="18" charset="0"/>
-              </a:rPr>
-              <a:t>Frontend: React.js</a:t>
-            </a:r>
-          </a:p>
-          <a:p>
-            <a:pPr>
-              <a:spcBef>
-                <a:spcPts val="0"/>
-              </a:spcBef>
-            </a:pPr>
-            <a:r>
-              <a:rPr lang="en-IN" dirty="0">
-                <a:latin typeface="Times New Roman" panose="02020603050405020304" pitchFamily="18" charset="0"/>
-                <a:cs typeface="Times New Roman" panose="02020603050405020304" pitchFamily="18" charset="0"/>
-              </a:rPr>
-              <a:t>Backend: Node.js, Express.js</a:t>
-            </a:r>
-          </a:p>
-          <a:p>
-            <a:pPr>
-              <a:spcBef>
-                <a:spcPts val="0"/>
-              </a:spcBef>
-            </a:pPr>
-            <a:r>
-              <a:rPr lang="en-IN" dirty="0">
-                <a:latin typeface="Times New Roman" panose="02020603050405020304" pitchFamily="18" charset="0"/>
-                <a:cs typeface="Times New Roman" panose="02020603050405020304" pitchFamily="18" charset="0"/>
-              </a:rPr>
-              <a:t>Database: MongoDB</a:t>
-            </a:r>
-          </a:p>
-          <a:p>
-            <a:pPr>
-              <a:spcBef>
-                <a:spcPts val="0"/>
-              </a:spcBef>
-            </a:pPr>
-            <a:r>
-              <a:rPr lang="en-IN" dirty="0">
-                <a:latin typeface="Times New Roman" panose="02020603050405020304" pitchFamily="18" charset="0"/>
-                <a:cs typeface="Times New Roman" panose="02020603050405020304" pitchFamily="18" charset="0"/>
-              </a:rPr>
-              <a:t>Tools: VS Code, Git, Browser</a:t>
-            </a:r>
-          </a:p>
-        </p:txBody>
-      </p:sp>
-    </p:spTree>
-    <p:extLst>
-      <p:ext uri="{BB962C8B-B14F-4D97-AF65-F5344CB8AC3E}">
-        <p14:creationId xmlns:p14="http://schemas.microsoft.com/office/powerpoint/2010/main" val="3034246271"/>
       </p:ext>
     </p:extLst>
   </p:cSld>
@@ -14323,6 +15651,26 @@
 </file>
 
 <file path=customXml/item1.xml><?xml version="1.0" encoding="utf-8"?>
+<p:properties xmlns:p="http://schemas.microsoft.com/office/2006/metadata/properties" xmlns:xsi="http://www.w3.org/2001/XMLSchema-instance" xmlns:pc="http://schemas.microsoft.com/office/infopath/2007/PartnerControls">
+  <documentManagement>
+    <Background xmlns="71af3243-3dd4-4a8d-8c0d-dd76da1f02a5">false</Background>
+    <Status xmlns="71af3243-3dd4-4a8d-8c0d-dd76da1f02a5">Not started</Status>
+    <_ip_UnifiedCompliancePolicyUIAction xmlns="http://schemas.microsoft.com/sharepoint/v3" xsi:nil="true"/>
+    <Image xmlns="71af3243-3dd4-4a8d-8c0d-dd76da1f02a5">
+      <Url xsi:nil="true"/>
+      <Description xsi:nil="true"/>
+    </Image>
+    <_ip_UnifiedCompliancePolicyProperties xmlns="http://schemas.microsoft.com/sharepoint/v3" xsi:nil="true"/>
+    <ImageTagsTaxHTField xmlns="71af3243-3dd4-4a8d-8c0d-dd76da1f02a5">
+      <Terms xmlns="http://schemas.microsoft.com/office/infopath/2007/PartnerControls"/>
+    </ImageTagsTaxHTField>
+    <TaxCatchAll xmlns="230e9df3-be65-4c73-a93b-d1236ebd677e" xsi:nil="true"/>
+    <MediaServiceKeyPoints xmlns="71af3243-3dd4-4a8d-8c0d-dd76da1f02a5" xsi:nil="true"/>
+  </documentManagement>
+</p:properties>
+</file>
+
+<file path=customXml/item2.xml><?xml version="1.0" encoding="utf-8"?>
 <ct:contentTypeSchema xmlns:ct="http://schemas.microsoft.com/office/2006/metadata/contentType" xmlns:ma="http://schemas.microsoft.com/office/2006/metadata/properties/metaAttributes" ct:_="" ma:_="" ma:contentTypeName="Document" ma:contentTypeID="0x01010079F111ED35F8CC479449609E8A0923A6" ma:contentTypeVersion="28" ma:contentTypeDescription="Create a new document." ma:contentTypeScope="" ma:versionID="60f5a4f2d2b0abadcf532d48ebf9cb71">
   <xsd:schema xmlns:xsd="http://www.w3.org/2001/XMLSchema" xmlns:xs="http://www.w3.org/2001/XMLSchema" xmlns:p="http://schemas.microsoft.com/office/2006/metadata/properties" xmlns:ns1="http://schemas.microsoft.com/sharepoint/v3" xmlns:ns2="71af3243-3dd4-4a8d-8c0d-dd76da1f02a5" xmlns:ns3="16c05727-aa75-4e4a-9b5f-8a80a1165891" xmlns:ns4="230e9df3-be65-4c73-a93b-d1236ebd677e" targetNamespace="http://schemas.microsoft.com/office/2006/metadata/properties" ma:root="true" ma:fieldsID="7dd78129e6a1811f84807ad11c651531" ns1:_="" ns2:_="" ns3:_="" ns4:_="">
     <xsd:import namespace="http://schemas.microsoft.com/sharepoint/v3"/>
@@ -14634,26 +15982,6 @@
 </ct:contentTypeSchema>
 </file>
 
-<file path=customXml/item2.xml><?xml version="1.0" encoding="utf-8"?>
-<p:properties xmlns:p="http://schemas.microsoft.com/office/2006/metadata/properties" xmlns:xsi="http://www.w3.org/2001/XMLSchema-instance" xmlns:pc="http://schemas.microsoft.com/office/infopath/2007/PartnerControls">
-  <documentManagement>
-    <Background xmlns="71af3243-3dd4-4a8d-8c0d-dd76da1f02a5">false</Background>
-    <Status xmlns="71af3243-3dd4-4a8d-8c0d-dd76da1f02a5">Not started</Status>
-    <_ip_UnifiedCompliancePolicyUIAction xmlns="http://schemas.microsoft.com/sharepoint/v3" xsi:nil="true"/>
-    <Image xmlns="71af3243-3dd4-4a8d-8c0d-dd76da1f02a5">
-      <Url xsi:nil="true"/>
-      <Description xsi:nil="true"/>
-    </Image>
-    <_ip_UnifiedCompliancePolicyProperties xmlns="http://schemas.microsoft.com/sharepoint/v3" xsi:nil="true"/>
-    <ImageTagsTaxHTField xmlns="71af3243-3dd4-4a8d-8c0d-dd76da1f02a5">
-      <Terms xmlns="http://schemas.microsoft.com/office/infopath/2007/PartnerControls"/>
-    </ImageTagsTaxHTField>
-    <TaxCatchAll xmlns="230e9df3-be65-4c73-a93b-d1236ebd677e" xsi:nil="true"/>
-    <MediaServiceKeyPoints xmlns="71af3243-3dd4-4a8d-8c0d-dd76da1f02a5" xsi:nil="true"/>
-  </documentManagement>
-</p:properties>
-</file>
-
 <file path=customXml/item3.xml><?xml version="1.0" encoding="utf-8"?>
 <?mso-contentType ?>
 <FormTemplates xmlns="http://schemas.microsoft.com/sharepoint/v3/contenttype/forms">
@@ -14664,6 +15992,25 @@
 </file>
 
 <file path=customXml/itemProps1.xml><?xml version="1.0" encoding="utf-8"?>
+<ds:datastoreItem xmlns:ds="http://schemas.openxmlformats.org/officeDocument/2006/customXml" ds:itemID="{4F4B194E-8B30-4377-8C59-ECFB902D2A26}">
+  <ds:schemaRefs>
+    <ds:schemaRef ds:uri="16c05727-aa75-4e4a-9b5f-8a80a1165891"/>
+    <ds:schemaRef ds:uri="http://purl.org/dc/terms/"/>
+    <ds:schemaRef ds:uri="http://schemas.microsoft.com/office/2006/documentManagement/types"/>
+    <ds:schemaRef ds:uri="http://purl.org/dc/elements/1.1/"/>
+    <ds:schemaRef ds:uri="http://schemas.openxmlformats.org/package/2006/metadata/core-properties"/>
+    <ds:schemaRef ds:uri="http://schemas.microsoft.com/sharepoint/v3"/>
+    <ds:schemaRef ds:uri="http://www.w3.org/XML/1998/namespace"/>
+    <ds:schemaRef ds:uri="http://purl.org/dc/dcmitype/"/>
+    <ds:schemaRef ds:uri="http://schemas.microsoft.com/office/infopath/2007/PartnerControls"/>
+    <ds:schemaRef ds:uri="230e9df3-be65-4c73-a93b-d1236ebd677e"/>
+    <ds:schemaRef ds:uri="71af3243-3dd4-4a8d-8c0d-dd76da1f02a5"/>
+    <ds:schemaRef ds:uri="http://schemas.microsoft.com/office/2006/metadata/properties"/>
+  </ds:schemaRefs>
+</ds:datastoreItem>
+</file>
+
+<file path=customXml/itemProps2.xml><?xml version="1.0" encoding="utf-8"?>
 <ds:datastoreItem xmlns:ds="http://schemas.openxmlformats.org/officeDocument/2006/customXml" ds:itemID="{92DB9E12-8AC3-4138-BF4D-720A5525AB10}">
   <ds:schemaRefs>
     <ds:schemaRef ds:uri="http://schemas.microsoft.com/office/2006/metadata/contentType"/>
@@ -14684,25 +16031,6 @@
 </ds:datastoreItem>
 </file>
 
-<file path=customXml/itemProps2.xml><?xml version="1.0" encoding="utf-8"?>
-<ds:datastoreItem xmlns:ds="http://schemas.openxmlformats.org/officeDocument/2006/customXml" ds:itemID="{4F4B194E-8B30-4377-8C59-ECFB902D2A26}">
-  <ds:schemaRefs>
-    <ds:schemaRef ds:uri="16c05727-aa75-4e4a-9b5f-8a80a1165891"/>
-    <ds:schemaRef ds:uri="http://purl.org/dc/terms/"/>
-    <ds:schemaRef ds:uri="http://schemas.microsoft.com/office/2006/documentManagement/types"/>
-    <ds:schemaRef ds:uri="http://purl.org/dc/elements/1.1/"/>
-    <ds:schemaRef ds:uri="http://schemas.openxmlformats.org/package/2006/metadata/core-properties"/>
-    <ds:schemaRef ds:uri="http://schemas.microsoft.com/sharepoint/v3"/>
-    <ds:schemaRef ds:uri="http://www.w3.org/XML/1998/namespace"/>
-    <ds:schemaRef ds:uri="http://purl.org/dc/dcmitype/"/>
-    <ds:schemaRef ds:uri="http://schemas.microsoft.com/office/infopath/2007/PartnerControls"/>
-    <ds:schemaRef ds:uri="230e9df3-be65-4c73-a93b-d1236ebd677e"/>
-    <ds:schemaRef ds:uri="71af3243-3dd4-4a8d-8c0d-dd76da1f02a5"/>
-    <ds:schemaRef ds:uri="http://schemas.microsoft.com/office/2006/metadata/properties"/>
-  </ds:schemaRefs>
-</ds:datastoreItem>
-</file>
-
 <file path=customXml/itemProps3.xml><?xml version="1.0" encoding="utf-8"?>
 <ds:datastoreItem xmlns:ds="http://schemas.openxmlformats.org/officeDocument/2006/customXml" ds:itemID="{C21FFAC0-05A2-416A-B06C-C248395482CF}">
   <ds:schemaRefs>

</xml_diff>